<commit_message>
Added the references slide
</commit_message>
<xml_diff>
--- a/ppt/Web Scraping using R.pptx
+++ b/ppt/Web Scraping using R.pptx
@@ -5,10 +5,10 @@
     <p:sldMasterId id="2147483648" r:id="rId5"/>
   </p:sldMasterIdLst>
   <p:notesMasterIdLst>
-    <p:notesMasterId r:id="rId15"/>
+    <p:notesMasterId r:id="rId16"/>
   </p:notesMasterIdLst>
   <p:handoutMasterIdLst>
-    <p:handoutMasterId r:id="rId16"/>
+    <p:handoutMasterId r:id="rId17"/>
   </p:handoutMasterIdLst>
   <p:sldIdLst>
     <p:sldId id="397" r:id="rId6"/>
@@ -17,9 +17,10 @@
     <p:sldId id="400" r:id="rId9"/>
     <p:sldId id="282" r:id="rId10"/>
     <p:sldId id="401" r:id="rId11"/>
-    <p:sldId id="391" r:id="rId12"/>
-    <p:sldId id="395" r:id="rId13"/>
-    <p:sldId id="378" r:id="rId14"/>
+    <p:sldId id="402" r:id="rId12"/>
+    <p:sldId id="391" r:id="rId13"/>
+    <p:sldId id="395" r:id="rId14"/>
+    <p:sldId id="378" r:id="rId15"/>
   </p:sldIdLst>
   <p:sldSz cx="12192000" cy="6858000"/>
   <p:notesSz cx="6858000" cy="9144000"/>
@@ -253,7 +254,7 @@
                 <a:latin typeface="Arial" pitchFamily="34" charset="0"/>
               </a:rPr>
               <a:pPr/>
-              <a:t>9/18/2019</a:t>
+              <a:t>9/20/2019</a:t>
             </a:fld>
             <a:endParaRPr lang="en-US" dirty="0">
               <a:latin typeface="Arial" pitchFamily="34" charset="0"/>
@@ -432,7 +433,7 @@
             <a:fld id="{B5D7A87D-1CDA-443F-BAE3-82C9C05446C3}" type="datetimeFigureOut">
               <a:rPr lang="en-US" smtClean="0"/>
               <a:pPr/>
-              <a:t>9/18/2019</a:t>
+              <a:t>9/20/2019</a:t>
             </a:fld>
             <a:endParaRPr lang="en-US" dirty="0"/>
           </a:p>
@@ -799,6 +800,98 @@
 </p:notes>
 </file>
 
+<file path=ppt/notesSlides/notesSlide10.xml><?xml version="1.0" encoding="utf-8"?>
+<p:notes xmlns:a="http://schemas.openxmlformats.org/drawingml/2006/main" xmlns:r="http://schemas.openxmlformats.org/officeDocument/2006/relationships" xmlns:p="http://schemas.openxmlformats.org/presentationml/2006/main">
+  <p:cSld>
+    <p:spTree>
+      <p:nvGrpSpPr>
+        <p:cNvPr id="1" name=""/>
+        <p:cNvGrpSpPr/>
+        <p:nvPr/>
+      </p:nvGrpSpPr>
+      <p:grpSpPr>
+        <a:xfrm>
+          <a:off x="0" y="0"/>
+          <a:ext cx="0" cy="0"/>
+          <a:chOff x="0" y="0"/>
+          <a:chExt cx="0" cy="0"/>
+        </a:xfrm>
+      </p:grpSpPr>
+      <p:sp>
+        <p:nvSpPr>
+          <p:cNvPr id="2" name="Slide Image Placeholder 1"/>
+          <p:cNvSpPr>
+            <a:spLocks noGrp="1" noRot="1" noChangeAspect="1"/>
+          </p:cNvSpPr>
+          <p:nvPr>
+            <p:ph type="sldImg"/>
+          </p:nvPr>
+        </p:nvSpPr>
+        <p:spPr>
+          <a:xfrm>
+            <a:off x="381000" y="685800"/>
+            <a:ext cx="6096000" cy="3429000"/>
+          </a:xfrm>
+        </p:spPr>
+      </p:sp>
+      <p:sp>
+        <p:nvSpPr>
+          <p:cNvPr id="3" name="Notes Placeholder 2"/>
+          <p:cNvSpPr>
+            <a:spLocks noGrp="1"/>
+          </p:cNvSpPr>
+          <p:nvPr>
+            <p:ph type="body" idx="1"/>
+          </p:nvPr>
+        </p:nvSpPr>
+        <p:spPr/>
+        <p:txBody>
+          <a:bodyPr>
+            <a:normAutofit/>
+          </a:bodyPr>
+          <a:lstStyle/>
+          <a:p>
+            <a:endParaRPr lang="en-US" dirty="0"/>
+          </a:p>
+        </p:txBody>
+      </p:sp>
+      <p:sp>
+        <p:nvSpPr>
+          <p:cNvPr id="4" name="Slide Number Placeholder 3"/>
+          <p:cNvSpPr>
+            <a:spLocks noGrp="1"/>
+          </p:cNvSpPr>
+          <p:nvPr>
+            <p:ph type="sldNum" sz="quarter" idx="10"/>
+          </p:nvPr>
+        </p:nvSpPr>
+        <p:spPr/>
+        <p:txBody>
+          <a:bodyPr/>
+          <a:lstStyle/>
+          <a:p>
+            <a:fld id="{20B9C825-F38E-45BB-92C1-043DE61C9183}" type="slidenum">
+              <a:rPr lang="en-US" smtClean="0"/>
+              <a:pPr/>
+              <a:t>10</a:t>
+            </a:fld>
+            <a:endParaRPr lang="en-US" dirty="0"/>
+          </a:p>
+        </p:txBody>
+      </p:sp>
+    </p:spTree>
+    <p:extLst>
+      <p:ext uri="{BB962C8B-B14F-4D97-AF65-F5344CB8AC3E}">
+        <p14:creationId xmlns:p14="http://schemas.microsoft.com/office/powerpoint/2010/main" val="669895288"/>
+      </p:ext>
+    </p:extLst>
+  </p:cSld>
+  <p:clrMapOvr>
+    <a:masterClrMapping/>
+  </p:clrMapOvr>
+</p:notes>
+</file>
+
 <file path=ppt/notesSlides/notesSlide2.xml><?xml version="1.0" encoding="utf-8"?>
 <p:notes xmlns:a="http://schemas.openxmlformats.org/drawingml/2006/main" xmlns:r="http://schemas.openxmlformats.org/officeDocument/2006/relationships" xmlns:p="http://schemas.openxmlformats.org/presentationml/2006/main">
   <p:cSld>
@@ -1311,6 +1404,10 @@
           </a:bodyPr>
           <a:lstStyle/>
           <a:p>
+            <a:r>
+              <a:rPr lang="en-US" dirty="0" smtClean="0"/>
+              <a:t>Scrapers are bound to fail in cases of site re-design.</a:t>
+            </a:r>
             <a:endParaRPr lang="en-US" dirty="0"/>
           </a:p>
         </p:txBody>
@@ -1342,7 +1439,7 @@
     </p:spTree>
     <p:extLst>
       <p:ext uri="{BB962C8B-B14F-4D97-AF65-F5344CB8AC3E}">
-        <p14:creationId xmlns:p14="http://schemas.microsoft.com/office/powerpoint/2010/main" val="3122527666"/>
+        <p14:creationId xmlns:p14="http://schemas.microsoft.com/office/powerpoint/2010/main" val="3117605232"/>
       </p:ext>
     </p:extLst>
   </p:cSld>
@@ -1353,91 +1450,6 @@
 </file>
 
 <file path=ppt/notesSlides/notesSlide8.xml><?xml version="1.0" encoding="utf-8"?>
-<p:notes xmlns:a="http://schemas.openxmlformats.org/drawingml/2006/main" xmlns:r="http://schemas.openxmlformats.org/officeDocument/2006/relationships" xmlns:p="http://schemas.openxmlformats.org/presentationml/2006/main">
-  <p:cSld>
-    <p:spTree>
-      <p:nvGrpSpPr>
-        <p:cNvPr id="1" name=""/>
-        <p:cNvGrpSpPr/>
-        <p:nvPr/>
-      </p:nvGrpSpPr>
-      <p:grpSpPr>
-        <a:xfrm>
-          <a:off x="0" y="0"/>
-          <a:ext cx="0" cy="0"/>
-          <a:chOff x="0" y="0"/>
-          <a:chExt cx="0" cy="0"/>
-        </a:xfrm>
-      </p:grpSpPr>
-      <p:sp>
-        <p:nvSpPr>
-          <p:cNvPr id="2" name="Slide Image Placeholder 1"/>
-          <p:cNvSpPr>
-            <a:spLocks noGrp="1" noRot="1" noChangeAspect="1"/>
-          </p:cNvSpPr>
-          <p:nvPr>
-            <p:ph type="sldImg"/>
-          </p:nvPr>
-        </p:nvSpPr>
-        <p:spPr/>
-      </p:sp>
-      <p:sp>
-        <p:nvSpPr>
-          <p:cNvPr id="3" name="Notes Placeholder 2"/>
-          <p:cNvSpPr>
-            <a:spLocks noGrp="1"/>
-          </p:cNvSpPr>
-          <p:nvPr>
-            <p:ph type="body" idx="1"/>
-          </p:nvPr>
-        </p:nvSpPr>
-        <p:spPr/>
-        <p:txBody>
-          <a:bodyPr/>
-          <a:lstStyle/>
-          <a:p>
-            <a:endParaRPr lang="en-US" dirty="0"/>
-          </a:p>
-        </p:txBody>
-      </p:sp>
-      <p:sp>
-        <p:nvSpPr>
-          <p:cNvPr id="4" name="Slide Number Placeholder 3"/>
-          <p:cNvSpPr>
-            <a:spLocks noGrp="1"/>
-          </p:cNvSpPr>
-          <p:nvPr>
-            <p:ph type="sldNum" sz="quarter" idx="10"/>
-          </p:nvPr>
-        </p:nvSpPr>
-        <p:spPr/>
-        <p:txBody>
-          <a:bodyPr/>
-          <a:lstStyle/>
-          <a:p>
-            <a:fld id="{20B9C825-F38E-45BB-92C1-043DE61C9183}" type="slidenum">
-              <a:rPr lang="en-US" smtClean="0"/>
-              <a:pPr/>
-              <a:t>8</a:t>
-            </a:fld>
-            <a:endParaRPr lang="en-US" dirty="0"/>
-          </a:p>
-        </p:txBody>
-      </p:sp>
-    </p:spTree>
-    <p:extLst>
-      <p:ext uri="{BB962C8B-B14F-4D97-AF65-F5344CB8AC3E}">
-        <p14:creationId xmlns:p14="http://schemas.microsoft.com/office/powerpoint/2010/main" val="1449978697"/>
-      </p:ext>
-    </p:extLst>
-  </p:cSld>
-  <p:clrMapOvr>
-    <a:masterClrMapping/>
-  </p:clrMapOvr>
-</p:notes>
-</file>
-
-<file path=ppt/notesSlides/notesSlide9.xml><?xml version="1.0" encoding="utf-8"?>
 <p:notes xmlns:a="http://schemas.openxmlformats.org/drawingml/2006/main" xmlns:r="http://schemas.openxmlformats.org/officeDocument/2006/relationships" xmlns:p="http://schemas.openxmlformats.org/presentationml/2006/main">
   <p:cSld>
     <p:spTree>
@@ -1510,7 +1522,7 @@
             <a:fld id="{20B9C825-F38E-45BB-92C1-043DE61C9183}" type="slidenum">
               <a:rPr lang="en-US" smtClean="0"/>
               <a:pPr/>
-              <a:t>9</a:t>
+              <a:t>8</a:t>
             </a:fld>
             <a:endParaRPr lang="en-US" dirty="0"/>
           </a:p>
@@ -1519,7 +1531,92 @@
     </p:spTree>
     <p:extLst>
       <p:ext uri="{BB962C8B-B14F-4D97-AF65-F5344CB8AC3E}">
-        <p14:creationId xmlns:p14="http://schemas.microsoft.com/office/powerpoint/2010/main" val="669895288"/>
+        <p14:creationId xmlns:p14="http://schemas.microsoft.com/office/powerpoint/2010/main" val="3122527666"/>
+      </p:ext>
+    </p:extLst>
+  </p:cSld>
+  <p:clrMapOvr>
+    <a:masterClrMapping/>
+  </p:clrMapOvr>
+</p:notes>
+</file>
+
+<file path=ppt/notesSlides/notesSlide9.xml><?xml version="1.0" encoding="utf-8"?>
+<p:notes xmlns:a="http://schemas.openxmlformats.org/drawingml/2006/main" xmlns:r="http://schemas.openxmlformats.org/officeDocument/2006/relationships" xmlns:p="http://schemas.openxmlformats.org/presentationml/2006/main">
+  <p:cSld>
+    <p:spTree>
+      <p:nvGrpSpPr>
+        <p:cNvPr id="1" name=""/>
+        <p:cNvGrpSpPr/>
+        <p:nvPr/>
+      </p:nvGrpSpPr>
+      <p:grpSpPr>
+        <a:xfrm>
+          <a:off x="0" y="0"/>
+          <a:ext cx="0" cy="0"/>
+          <a:chOff x="0" y="0"/>
+          <a:chExt cx="0" cy="0"/>
+        </a:xfrm>
+      </p:grpSpPr>
+      <p:sp>
+        <p:nvSpPr>
+          <p:cNvPr id="2" name="Slide Image Placeholder 1"/>
+          <p:cNvSpPr>
+            <a:spLocks noGrp="1" noRot="1" noChangeAspect="1"/>
+          </p:cNvSpPr>
+          <p:nvPr>
+            <p:ph type="sldImg"/>
+          </p:nvPr>
+        </p:nvSpPr>
+        <p:spPr/>
+      </p:sp>
+      <p:sp>
+        <p:nvSpPr>
+          <p:cNvPr id="3" name="Notes Placeholder 2"/>
+          <p:cNvSpPr>
+            <a:spLocks noGrp="1"/>
+          </p:cNvSpPr>
+          <p:nvPr>
+            <p:ph type="body" idx="1"/>
+          </p:nvPr>
+        </p:nvSpPr>
+        <p:spPr/>
+        <p:txBody>
+          <a:bodyPr/>
+          <a:lstStyle/>
+          <a:p>
+            <a:endParaRPr lang="en-US" dirty="0"/>
+          </a:p>
+        </p:txBody>
+      </p:sp>
+      <p:sp>
+        <p:nvSpPr>
+          <p:cNvPr id="4" name="Slide Number Placeholder 3"/>
+          <p:cNvSpPr>
+            <a:spLocks noGrp="1"/>
+          </p:cNvSpPr>
+          <p:nvPr>
+            <p:ph type="sldNum" sz="quarter" idx="10"/>
+          </p:nvPr>
+        </p:nvSpPr>
+        <p:spPr/>
+        <p:txBody>
+          <a:bodyPr/>
+          <a:lstStyle/>
+          <a:p>
+            <a:fld id="{20B9C825-F38E-45BB-92C1-043DE61C9183}" type="slidenum">
+              <a:rPr lang="en-US" smtClean="0"/>
+              <a:pPr/>
+              <a:t>9</a:t>
+            </a:fld>
+            <a:endParaRPr lang="en-US" dirty="0"/>
+          </a:p>
+        </p:txBody>
+      </p:sp>
+    </p:spTree>
+    <p:extLst>
+      <p:ext uri="{BB962C8B-B14F-4D97-AF65-F5344CB8AC3E}">
+        <p14:creationId xmlns:p14="http://schemas.microsoft.com/office/powerpoint/2010/main" val="1449978697"/>
       </p:ext>
     </p:extLst>
   </p:cSld>
@@ -6415,7 +6512,7 @@
               <a:pPr/>
               <a:t>‹#›</a:t>
             </a:fld>
-            <a:endParaRPr lang="en-US"/>
+            <a:endParaRPr lang="en-US" dirty="0"/>
           </a:p>
         </p:txBody>
       </p:sp>
@@ -6497,7 +6594,7 @@
           <a:p>
             <a:pPr algn="ctr"/>
             <a:r>
-              <a:rPr lang="en-US" smtClean="0"/>
+              <a:rPr lang="en-US" dirty="0" smtClean="0"/>
               <a:t>Date</a:t>
             </a:r>
             <a:endParaRPr lang="en-US" dirty="0"/>
@@ -11370,7 +11467,7 @@
               <a:pPr/>
               <a:t>‹#›</a:t>
             </a:fld>
-            <a:endParaRPr lang="en-US"/>
+            <a:endParaRPr lang="en-US" dirty="0"/>
           </a:p>
         </p:txBody>
       </p:sp>
@@ -11452,7 +11549,7 @@
           <a:p>
             <a:pPr algn="ctr"/>
             <a:r>
-              <a:rPr lang="en-US" smtClean="0"/>
+              <a:rPr lang="en-US" dirty="0" smtClean="0"/>
               <a:t>Date</a:t>
             </a:r>
             <a:endParaRPr lang="en-US" dirty="0"/>
@@ -13170,7 +13267,7 @@
               <a:pPr/>
               <a:t>‹#›</a:t>
             </a:fld>
-            <a:endParaRPr lang="en-US"/>
+            <a:endParaRPr lang="en-US" dirty="0"/>
           </a:p>
         </p:txBody>
       </p:sp>
@@ -13252,7 +13349,7 @@
           <a:p>
             <a:pPr algn="ctr"/>
             <a:r>
-              <a:rPr lang="en-US" smtClean="0"/>
+              <a:rPr lang="en-US" dirty="0" smtClean="0"/>
               <a:t>Date</a:t>
             </a:r>
             <a:endParaRPr lang="en-US" dirty="0"/>
@@ -13613,7 +13710,7 @@
               <a:pPr/>
               <a:t>‹#›</a:t>
             </a:fld>
-            <a:endParaRPr lang="en-US"/>
+            <a:endParaRPr lang="en-US" dirty="0"/>
           </a:p>
         </p:txBody>
       </p:sp>
@@ -13695,7 +13792,7 @@
           <a:p>
             <a:pPr algn="ctr"/>
             <a:r>
-              <a:rPr lang="en-US" smtClean="0"/>
+              <a:rPr lang="en-US" dirty="0" smtClean="0"/>
               <a:t>Date</a:t>
             </a:r>
             <a:endParaRPr lang="en-US" dirty="0"/>
@@ -14488,7 +14585,7 @@
               <a:pPr/>
               <a:t>‹#›</a:t>
             </a:fld>
-            <a:endParaRPr lang="en-US"/>
+            <a:endParaRPr lang="en-US" dirty="0"/>
           </a:p>
         </p:txBody>
       </p:sp>
@@ -14570,7 +14667,7 @@
           <a:p>
             <a:pPr algn="ctr"/>
             <a:r>
-              <a:rPr lang="en-US" smtClean="0"/>
+              <a:rPr lang="en-US" dirty="0" smtClean="0"/>
               <a:t>Date</a:t>
             </a:r>
             <a:endParaRPr lang="en-US" dirty="0"/>
@@ -14891,7 +14988,7 @@
               <a:pPr/>
               <a:t>‹#›</a:t>
             </a:fld>
-            <a:endParaRPr lang="en-US"/>
+            <a:endParaRPr lang="en-US" dirty="0"/>
           </a:p>
         </p:txBody>
       </p:sp>
@@ -14973,7 +15070,7 @@
           <a:p>
             <a:pPr algn="ctr"/>
             <a:r>
-              <a:rPr lang="en-US" smtClean="0"/>
+              <a:rPr lang="en-US" dirty="0" smtClean="0"/>
               <a:t>Date</a:t>
             </a:r>
             <a:endParaRPr lang="en-US" dirty="0"/>
@@ -15307,7 +15404,7 @@
               <a:pPr/>
               <a:t>‹#›</a:t>
             </a:fld>
-            <a:endParaRPr lang="en-US"/>
+            <a:endParaRPr lang="en-US" dirty="0"/>
           </a:p>
         </p:txBody>
       </p:sp>
@@ -15389,7 +15486,7 @@
           <a:p>
             <a:pPr algn="ctr"/>
             <a:r>
-              <a:rPr lang="en-US" smtClean="0"/>
+              <a:rPr lang="en-US" dirty="0" smtClean="0"/>
               <a:t>Date</a:t>
             </a:r>
             <a:endParaRPr lang="en-US" dirty="0"/>
@@ -16032,7 +16129,7 @@
               <a:pPr/>
               <a:t>‹#›</a:t>
             </a:fld>
-            <a:endParaRPr lang="en-US"/>
+            <a:endParaRPr lang="en-US" dirty="0"/>
           </a:p>
         </p:txBody>
       </p:sp>
@@ -16114,7 +16211,7 @@
           <a:p>
             <a:pPr algn="ctr"/>
             <a:r>
-              <a:rPr lang="en-US" smtClean="0"/>
+              <a:rPr lang="en-US" dirty="0" smtClean="0"/>
               <a:t>Date</a:t>
             </a:r>
             <a:endParaRPr lang="en-US" dirty="0"/>
@@ -16389,7 +16486,7 @@
               <a:pPr/>
               <a:t>‹#›</a:t>
             </a:fld>
-            <a:endParaRPr lang="en-US"/>
+            <a:endParaRPr lang="en-US" dirty="0"/>
           </a:p>
         </p:txBody>
       </p:sp>
@@ -16471,7 +16568,7 @@
           <a:p>
             <a:pPr algn="ctr"/>
             <a:r>
-              <a:rPr lang="en-US" smtClean="0"/>
+              <a:rPr lang="en-US" dirty="0" smtClean="0"/>
               <a:t>Date</a:t>
             </a:r>
             <a:endParaRPr lang="en-US" dirty="0"/>
@@ -16582,7 +16679,7 @@
               <a:pPr/>
               <a:t>‹#›</a:t>
             </a:fld>
-            <a:endParaRPr lang="en-US"/>
+            <a:endParaRPr lang="en-US" dirty="0"/>
           </a:p>
         </p:txBody>
       </p:sp>
@@ -16693,7 +16790,7 @@
           <a:p>
             <a:pPr algn="ctr"/>
             <a:r>
-              <a:rPr lang="en-US" smtClean="0"/>
+              <a:rPr lang="en-US" dirty="0" smtClean="0"/>
               <a:t>Date</a:t>
             </a:r>
             <a:endParaRPr lang="en-US" dirty="0"/>
@@ -17280,7 +17377,7 @@
               <a:pPr/>
               <a:t>‹#›</a:t>
             </a:fld>
-            <a:endParaRPr lang="en-US"/>
+            <a:endParaRPr lang="en-US" dirty="0"/>
           </a:p>
         </p:txBody>
       </p:sp>
@@ -17528,7 +17625,7 @@
           <a:p>
             <a:pPr algn="ctr"/>
             <a:r>
-              <a:rPr lang="en-US" smtClean="0"/>
+              <a:rPr lang="en-US" dirty="0" smtClean="0"/>
               <a:t>Date</a:t>
             </a:r>
             <a:endParaRPr lang="en-US" dirty="0"/>
@@ -17875,7 +17972,7 @@
               <a:pPr/>
               <a:t>‹#›</a:t>
             </a:fld>
-            <a:endParaRPr lang="en-US"/>
+            <a:endParaRPr lang="en-US" dirty="0"/>
           </a:p>
         </p:txBody>
       </p:sp>
@@ -17957,7 +18054,7 @@
           <a:p>
             <a:pPr algn="ctr"/>
             <a:r>
-              <a:rPr lang="en-US" smtClean="0"/>
+              <a:rPr lang="en-US" dirty="0" smtClean="0"/>
               <a:t>Date</a:t>
             </a:r>
             <a:endParaRPr lang="en-US" dirty="0"/>
@@ -18551,7 +18648,7 @@
               <a:pPr/>
               <a:t>‹#›</a:t>
             </a:fld>
-            <a:endParaRPr lang="en-US"/>
+            <a:endParaRPr lang="en-US" dirty="0"/>
           </a:p>
         </p:txBody>
       </p:sp>
@@ -19349,7 +19446,7 @@
           <a:p>
             <a:pPr algn="ctr"/>
             <a:r>
-              <a:rPr lang="en-US" smtClean="0"/>
+              <a:rPr lang="en-US" dirty="0" smtClean="0"/>
               <a:t>Date</a:t>
             </a:r>
             <a:endParaRPr lang="en-US" dirty="0"/>
@@ -19483,7 +19580,7 @@
               <a:pPr/>
               <a:t>‹#›</a:t>
             </a:fld>
-            <a:endParaRPr lang="en-US"/>
+            <a:endParaRPr lang="en-US" dirty="0"/>
           </a:p>
         </p:txBody>
       </p:sp>
@@ -20534,7 +20631,7 @@
           <a:p>
             <a:pPr algn="ctr"/>
             <a:r>
-              <a:rPr lang="en-US" smtClean="0"/>
+              <a:rPr lang="en-US" dirty="0" smtClean="0"/>
               <a:t>Date</a:t>
             </a:r>
             <a:endParaRPr lang="en-US" dirty="0"/>
@@ -21118,7 +21215,7 @@
               <a:pPr/>
               <a:t>‹#›</a:t>
             </a:fld>
-            <a:endParaRPr lang="en-US"/>
+            <a:endParaRPr lang="en-US" dirty="0"/>
           </a:p>
         </p:txBody>
       </p:sp>
@@ -21200,7 +21297,7 @@
           <a:p>
             <a:pPr algn="ctr"/>
             <a:r>
-              <a:rPr lang="en-US" smtClean="0"/>
+              <a:rPr lang="en-US" dirty="0" smtClean="0"/>
               <a:t>Date</a:t>
             </a:r>
             <a:endParaRPr lang="en-US" dirty="0"/>
@@ -21468,7 +21565,7 @@
               <a:pPr/>
               <a:t>‹#›</a:t>
             </a:fld>
-            <a:endParaRPr lang="en-US"/>
+            <a:endParaRPr lang="en-US" dirty="0"/>
           </a:p>
         </p:txBody>
       </p:sp>
@@ -21550,7 +21647,7 @@
           <a:p>
             <a:pPr algn="ctr"/>
             <a:r>
-              <a:rPr lang="en-US" smtClean="0"/>
+              <a:rPr lang="en-US" dirty="0" smtClean="0"/>
               <a:t>Date</a:t>
             </a:r>
             <a:endParaRPr lang="en-US" dirty="0"/>
@@ -21840,7 +21937,7 @@
               <a:pPr/>
               <a:t>‹#›</a:t>
             </a:fld>
-            <a:endParaRPr lang="en-US"/>
+            <a:endParaRPr lang="en-US" dirty="0"/>
           </a:p>
         </p:txBody>
       </p:sp>
@@ -21951,7 +22048,7 @@
           <a:p>
             <a:pPr algn="ctr"/>
             <a:r>
-              <a:rPr lang="en-US" smtClean="0"/>
+              <a:rPr lang="en-US" dirty="0" smtClean="0"/>
               <a:t>Date</a:t>
             </a:r>
             <a:endParaRPr lang="en-US" dirty="0"/>
@@ -22250,7 +22347,7 @@
               <a:pPr/>
               <a:t>‹#›</a:t>
             </a:fld>
-            <a:endParaRPr lang="en-US"/>
+            <a:endParaRPr lang="en-US" dirty="0"/>
           </a:p>
         </p:txBody>
       </p:sp>
@@ -22332,7 +22429,7 @@
           <a:p>
             <a:pPr algn="ctr"/>
             <a:r>
-              <a:rPr lang="en-US" smtClean="0"/>
+              <a:rPr lang="en-US" dirty="0" smtClean="0"/>
               <a:t>Date</a:t>
             </a:r>
             <a:endParaRPr lang="en-US" dirty="0"/>
@@ -22828,7 +22925,7 @@
               <a:pPr/>
               <a:t>‹#›</a:t>
             </a:fld>
-            <a:endParaRPr lang="en-US"/>
+            <a:endParaRPr lang="en-US" dirty="0"/>
           </a:p>
         </p:txBody>
       </p:sp>
@@ -22910,7 +23007,7 @@
           <a:p>
             <a:pPr algn="ctr"/>
             <a:r>
-              <a:rPr lang="en-US" smtClean="0"/>
+              <a:rPr lang="en-US" dirty="0" smtClean="0"/>
               <a:t>Date</a:t>
             </a:r>
             <a:endParaRPr lang="en-US" dirty="0"/>
@@ -23023,7 +23120,7 @@
               <a:pPr/>
               <a:t>‹#›</a:t>
             </a:fld>
-            <a:endParaRPr lang="en-US"/>
+            <a:endParaRPr lang="en-US" dirty="0"/>
           </a:p>
         </p:txBody>
       </p:sp>
@@ -23105,7 +23202,7 @@
           <a:p>
             <a:pPr algn="ctr"/>
             <a:r>
-              <a:rPr lang="en-US" smtClean="0"/>
+              <a:rPr lang="en-US" dirty="0" smtClean="0"/>
               <a:t>Date</a:t>
             </a:r>
             <a:endParaRPr lang="en-US" dirty="0"/>
@@ -23185,7 +23282,7 @@
               <a:pPr/>
               <a:t>‹#›</a:t>
             </a:fld>
-            <a:endParaRPr lang="en-US"/>
+            <a:endParaRPr lang="en-US" dirty="0"/>
           </a:p>
         </p:txBody>
       </p:sp>
@@ -23267,7 +23364,7 @@
           <a:p>
             <a:pPr algn="ctr"/>
             <a:r>
-              <a:rPr lang="en-US" smtClean="0"/>
+              <a:rPr lang="en-US" dirty="0" smtClean="0"/>
               <a:t>Date</a:t>
             </a:r>
             <a:endParaRPr lang="en-US" dirty="0"/>
@@ -23555,7 +23652,7 @@
               <a:pPr/>
               <a:t>‹#›</a:t>
             </a:fld>
-            <a:endParaRPr lang="en-US"/>
+            <a:endParaRPr lang="en-US" dirty="0"/>
           </a:p>
         </p:txBody>
       </p:sp>
@@ -23637,7 +23734,7 @@
           <a:p>
             <a:pPr algn="ctr"/>
             <a:r>
-              <a:rPr lang="en-US" smtClean="0"/>
+              <a:rPr lang="en-US" dirty="0" smtClean="0"/>
               <a:t>Date</a:t>
             </a:r>
             <a:endParaRPr lang="en-US" dirty="0"/>
@@ -24118,7 +24215,7 @@
               <a:pPr/>
               <a:t>‹#›</a:t>
             </a:fld>
-            <a:endParaRPr lang="en-US"/>
+            <a:endParaRPr lang="en-US" dirty="0"/>
           </a:p>
         </p:txBody>
       </p:sp>
@@ -24200,7 +24297,7 @@
           <a:p>
             <a:pPr algn="ctr"/>
             <a:r>
-              <a:rPr lang="en-US" smtClean="0"/>
+              <a:rPr lang="en-US" dirty="0" smtClean="0"/>
               <a:t>Date</a:t>
             </a:r>
             <a:endParaRPr lang="en-US" dirty="0"/>
@@ -24986,7 +25083,7 @@
               <a:pPr/>
               <a:t>‹#›</a:t>
             </a:fld>
-            <a:endParaRPr lang="en-US"/>
+            <a:endParaRPr lang="en-US" dirty="0"/>
           </a:p>
         </p:txBody>
       </p:sp>
@@ -25114,7 +25211,7 @@
           <a:p>
             <a:pPr algn="ctr"/>
             <a:r>
-              <a:rPr lang="en-US" smtClean="0"/>
+              <a:rPr lang="en-US" dirty="0" smtClean="0"/>
               <a:t>Date</a:t>
             </a:r>
             <a:endParaRPr lang="en-US" dirty="0"/>
@@ -25502,7 +25599,7 @@
         <p:spPr/>
         <p:txBody>
           <a:bodyPr>
-            <a:normAutofit lnSpcReduction="10000"/>
+            <a:normAutofit fontScale="92500" lnSpcReduction="20000"/>
           </a:bodyPr>
           <a:lstStyle/>
           <a:p>
@@ -25532,8 +25629,15 @@
           <a:p>
             <a:r>
               <a:rPr lang="en-US" sz="1800" b="0" dirty="0" smtClean="0"/>
-              <a:t>Sr.Consultant</a:t>
+              <a:t>Sr.Consultant,</a:t>
             </a:r>
+          </a:p>
+          <a:p>
+            <a:r>
+              <a:rPr lang="en-CA" sz="1800" b="0" dirty="0" smtClean="0"/>
+              <a:t>CGI Inc., Halifax</a:t>
+            </a:r>
+            <a:endParaRPr lang="en-US" sz="1800" b="0" dirty="0" smtClean="0"/>
           </a:p>
           <a:p>
             <a:r>
@@ -25579,6 +25683,97 @@
     <a:masterClrMapping/>
   </p:clrMapOvr>
   <p:transition/>
+  <p:timing>
+    <p:tnLst>
+      <p:par>
+        <p:cTn id="1" dur="indefinite" restart="never" nodeType="tmRoot"/>
+      </p:par>
+    </p:tnLst>
+  </p:timing>
+</p:sld>
+</file>
+
+<file path=ppt/slides/slide10.xml><?xml version="1.0" encoding="utf-8"?>
+<p:sld xmlns:a="http://schemas.openxmlformats.org/drawingml/2006/main" xmlns:r="http://schemas.openxmlformats.org/officeDocument/2006/relationships" xmlns:p="http://schemas.openxmlformats.org/presentationml/2006/main">
+  <p:cSld>
+    <p:spTree>
+      <p:nvGrpSpPr>
+        <p:cNvPr id="1" name=""/>
+        <p:cNvGrpSpPr/>
+        <p:nvPr/>
+      </p:nvGrpSpPr>
+      <p:grpSpPr>
+        <a:xfrm>
+          <a:off x="0" y="0"/>
+          <a:ext cx="0" cy="0"/>
+          <a:chOff x="0" y="0"/>
+          <a:chExt cx="0" cy="0"/>
+        </a:xfrm>
+      </p:grpSpPr>
+      <p:sp>
+        <p:nvSpPr>
+          <p:cNvPr id="2" name="Title 1"/>
+          <p:cNvSpPr>
+            <a:spLocks noGrp="1"/>
+          </p:cNvSpPr>
+          <p:nvPr>
+            <p:ph type="ctrTitle"/>
+          </p:nvPr>
+        </p:nvSpPr>
+        <p:spPr/>
+        <p:txBody>
+          <a:bodyPr anchor="ctr">
+            <a:normAutofit/>
+          </a:bodyPr>
+          <a:lstStyle/>
+          <a:p>
+            <a:pPr algn="ctr"/>
+            <a:r>
+              <a:rPr lang="en-US" sz="7200" dirty="0" smtClean="0"/>
+              <a:t>Q&amp;A</a:t>
+            </a:r>
+            <a:endParaRPr lang="en-US" sz="6000" dirty="0">
+              <a:solidFill>
+                <a:schemeClr val="tx1"/>
+              </a:solidFill>
+            </a:endParaRPr>
+          </a:p>
+        </p:txBody>
+      </p:sp>
+      <p:sp>
+        <p:nvSpPr>
+          <p:cNvPr id="4" name="Slide Number Placeholder 3"/>
+          <p:cNvSpPr>
+            <a:spLocks noGrp="1"/>
+          </p:cNvSpPr>
+          <p:nvPr>
+            <p:ph type="sldNum" sz="quarter" idx="4"/>
+          </p:nvPr>
+        </p:nvSpPr>
+        <p:spPr/>
+        <p:txBody>
+          <a:bodyPr/>
+          <a:lstStyle/>
+          <a:p>
+            <a:fld id="{525A3C56-E491-49B2-93F3-63532DF516BC}" type="slidenum">
+              <a:rPr lang="en-US" smtClean="0"/>
+              <a:pPr/>
+              <a:t>10</a:t>
+            </a:fld>
+            <a:endParaRPr lang="en-US" dirty="0"/>
+          </a:p>
+        </p:txBody>
+      </p:sp>
+    </p:spTree>
+    <p:extLst>
+      <p:ext uri="{BB962C8B-B14F-4D97-AF65-F5344CB8AC3E}">
+        <p14:creationId xmlns:p14="http://schemas.microsoft.com/office/powerpoint/2010/main" val="96958150"/>
+      </p:ext>
+    </p:extLst>
+  </p:cSld>
+  <p:clrMapOvr>
+    <a:masterClrMapping/>
+  </p:clrMapOvr>
   <p:timing>
     <p:tnLst>
       <p:par>
@@ -25673,11 +25868,7 @@
             </a:pPr>
             <a:r>
               <a:rPr lang="en-US" sz="2400" dirty="0" smtClean="0"/>
-              <a:t>Introduction </a:t>
-            </a:r>
-            <a:r>
-              <a:rPr lang="en-US" sz="2400" dirty="0" smtClean="0"/>
-              <a:t>of R programming language</a:t>
+              <a:t>Introduction of R programming language</a:t>
             </a:r>
           </a:p>
           <a:p>
@@ -25711,6 +25902,23 @@
               <a:rPr lang="en-CA" sz="2400" dirty="0" smtClean="0"/>
               <a:t>Demo</a:t>
             </a:r>
+          </a:p>
+          <a:p>
+            <a:pPr marL="285750" indent="-285750">
+              <a:spcBef>
+                <a:spcPts val="0"/>
+              </a:spcBef>
+              <a:spcAft>
+                <a:spcPts val="500"/>
+              </a:spcAft>
+              <a:buFont typeface="Arial" panose="020B0604020202020204" pitchFamily="34" charset="0"/>
+              <a:buChar char="•"/>
+            </a:pPr>
+            <a:r>
+              <a:rPr lang="en-CA" sz="2400" dirty="0" smtClean="0"/>
+              <a:t>References</a:t>
+            </a:r>
+            <a:endParaRPr lang="en-CA" sz="2400" dirty="0" smtClean="0"/>
           </a:p>
           <a:p>
             <a:pPr marL="285750" indent="-285750">
@@ -26129,6 +26337,47 @@
           </a:prstGeom>
         </p:spPr>
       </p:pic>
+      <p:sp>
+        <p:nvSpPr>
+          <p:cNvPr id="6" name="TextBox 5"/>
+          <p:cNvSpPr txBox="1"/>
+          <p:nvPr/>
+        </p:nvSpPr>
+        <p:spPr bwMode="auto">
+          <a:xfrm>
+            <a:off x="596901" y="6374678"/>
+            <a:ext cx="7175499" cy="184666"/>
+          </a:xfrm>
+          <a:prstGeom prst="rect">
+            <a:avLst/>
+          </a:prstGeom>
+          <a:noFill/>
+          <a:ln w="9525" algn="ctr">
+            <a:noFill/>
+            <a:miter lim="800000"/>
+            <a:headEnd/>
+            <a:tailEnd/>
+          </a:ln>
+          <a:effectLst/>
+        </p:spPr>
+        <p:txBody>
+          <a:bodyPr wrap="square" lIns="0" tIns="0" rIns="0" bIns="0" rtlCol="0">
+            <a:spAutoFit/>
+          </a:bodyPr>
+          <a:lstStyle/>
+          <a:p>
+            <a:r>
+              <a:rPr lang="en-US" sz="1200" dirty="0">
+                <a:cs typeface="Arial" pitchFamily="34" charset="0"/>
+              </a:rPr>
+              <a:t>image source — http://bigdatasciencetraining.com/importance-of-learning-r-for-data-science/</a:t>
+            </a:r>
+            <a:endParaRPr lang="en-US" sz="1200" dirty="0" smtClean="0">
+              <a:cs typeface="Arial" pitchFamily="34" charset="0"/>
+            </a:endParaRPr>
+          </a:p>
+        </p:txBody>
+      </p:sp>
     </p:spTree>
     <p:extLst>
       <p:ext uri="{BB962C8B-B14F-4D97-AF65-F5344CB8AC3E}">
@@ -26247,7 +26496,7 @@
         </p:nvSpPr>
         <p:spPr bwMode="auto">
           <a:xfrm>
-            <a:off x="662216" y="6270174"/>
+            <a:off x="596901" y="6270174"/>
             <a:ext cx="4824185" cy="184666"/>
           </a:xfrm>
           <a:prstGeom prst="rect">
@@ -26472,19 +26721,13 @@
               <a:rPr lang="en-US" sz="1800" dirty="0" smtClean="0"/>
               <a:t>The most popular IDE in the market for R</a:t>
             </a:r>
-            <a:endParaRPr lang="en-US" sz="1800" dirty="0" smtClean="0"/>
           </a:p>
           <a:p>
             <a:pPr lvl="1"/>
             <a:r>
               <a:rPr lang="en-US" sz="1800" dirty="0" smtClean="0"/>
-              <a:t>It can be installed </a:t>
+              <a:t>It can be installed on most operating system as a software</a:t>
             </a:r>
-            <a:r>
-              <a:rPr lang="en-US" sz="1800" dirty="0" smtClean="0"/>
-              <a:t>on most operating system as a software</a:t>
-            </a:r>
-            <a:endParaRPr lang="en-US" sz="1800" dirty="0" smtClean="0"/>
           </a:p>
           <a:p>
             <a:pPr lvl="1"/>
@@ -26530,17 +26773,8 @@
             <a:pPr lvl="1"/>
             <a:r>
               <a:rPr lang="en-US" sz="1800" dirty="0" smtClean="0"/>
-              <a:t>One of the most popular environments in data science</a:t>
+              <a:t>One of the most popular environments in data science.  </a:t>
             </a:r>
-            <a:r>
-              <a:rPr lang="en-US" sz="1800" dirty="0" smtClean="0"/>
-              <a:t>. </a:t>
-            </a:r>
-            <a:r>
-              <a:rPr lang="en-US" sz="1800" dirty="0" smtClean="0"/>
-              <a:t> </a:t>
-            </a:r>
-            <a:endParaRPr lang="en-US" sz="1800" dirty="0" smtClean="0"/>
           </a:p>
           <a:p>
             <a:pPr lvl="1"/>
@@ -26548,7 +26782,6 @@
               <a:rPr lang="en-US" sz="1800" dirty="0" smtClean="0"/>
               <a:t>Can be installed via Anaconda for windows</a:t>
             </a:r>
-            <a:endParaRPr lang="en-US" sz="1800" dirty="0" smtClean="0"/>
           </a:p>
           <a:p>
             <a:pPr lvl="1"/>
@@ -26700,106 +26933,213 @@
       </p:grpSpPr>
       <p:sp>
         <p:nvSpPr>
-          <p:cNvPr id="2" name="Title 1"/>
+          <p:cNvPr id="8" name="Title 7"/>
           <p:cNvSpPr>
             <a:spLocks noGrp="1"/>
           </p:cNvSpPr>
           <p:nvPr>
-            <p:ph type="ctrTitle"/>
+            <p:ph type="title"/>
+          </p:nvPr>
+        </p:nvSpPr>
+        <p:spPr/>
+        <p:txBody>
+          <a:bodyPr/>
+          <a:lstStyle/>
+          <a:p>
+            <a:r>
+              <a:rPr lang="en-US" dirty="0" smtClean="0"/>
+              <a:t>References</a:t>
+            </a:r>
+            <a:endParaRPr lang="en-US" dirty="0"/>
+          </a:p>
+        </p:txBody>
+      </p:sp>
+      <p:sp>
+        <p:nvSpPr>
+          <p:cNvPr id="4" name="Content Placeholder 3"/>
+          <p:cNvSpPr>
+            <a:spLocks noGrp="1"/>
+          </p:cNvSpPr>
+          <p:nvPr>
+            <p:ph sz="quarter" idx="17"/>
           </p:nvPr>
         </p:nvSpPr>
         <p:spPr>
           <a:xfrm>
-            <a:off x="5448301" y="1035107"/>
-            <a:ext cx="6119812" cy="2446092"/>
-          </a:xfrm>
-        </p:spPr>
-        <p:txBody>
-          <a:bodyPr anchor="t"/>
-          <a:lstStyle/>
-          <a:p>
-            <a:r>
-              <a:rPr lang="en-US" dirty="0" smtClean="0"/>
-              <a:t>Demo</a:t>
-            </a:r>
-            <a:br>
-              <a:rPr lang="en-US" dirty="0" smtClean="0"/>
-            </a:br>
-            <a:r>
-              <a:rPr lang="en-US" sz="2400" b="1" dirty="0" smtClean="0">
-                <a:solidFill>
-                  <a:schemeClr val="tx1"/>
-                </a:solidFill>
-              </a:rPr>
-              <a:t>Subject: Extracting Script rates from Yahoo finance</a:t>
-            </a:r>
-            <a:r>
-              <a:rPr lang="en-US" dirty="0" smtClean="0"/>
-              <a:t/>
-            </a:r>
-            <a:br>
-              <a:rPr lang="en-US" dirty="0" smtClean="0"/>
-            </a:br>
-            <a:endParaRPr lang="en-US" dirty="0"/>
-          </a:p>
-        </p:txBody>
-      </p:sp>
-      <p:sp>
-        <p:nvSpPr>
-          <p:cNvPr id="16" name="Subtitle 15"/>
-          <p:cNvSpPr>
-            <a:spLocks noGrp="1"/>
-          </p:cNvSpPr>
-          <p:nvPr>
-            <p:ph type="subTitle" idx="1"/>
-          </p:nvPr>
-        </p:nvSpPr>
-        <p:spPr>
-          <a:xfrm>
-            <a:off x="5448302" y="3481199"/>
-            <a:ext cx="6119811" cy="1730881"/>
+            <a:off x="599018" y="1059404"/>
+            <a:ext cx="10969095" cy="5322346"/>
           </a:xfrm>
         </p:spPr>
         <p:txBody>
           <a:bodyPr/>
           <a:lstStyle/>
           <a:p>
+            <a:pPr marL="285750" indent="-285750">
+              <a:spcBef>
+                <a:spcPts val="0"/>
+              </a:spcBef>
+              <a:spcAft>
+                <a:spcPts val="500"/>
+              </a:spcAft>
+              <a:buFont typeface="Arial" panose="020B0604020202020204" pitchFamily="34" charset="0"/>
+              <a:buChar char="•"/>
+            </a:pPr>
+            <a:r>
+              <a:rPr lang="en-CA" dirty="0"/>
+              <a:t>https://</a:t>
+            </a:r>
+            <a:r>
+              <a:rPr lang="en-CA" dirty="0" smtClean="0"/>
+              <a:t>rstudio.cloud</a:t>
+            </a:r>
+          </a:p>
+          <a:p>
+            <a:pPr marL="285750" indent="-285750">
+              <a:spcBef>
+                <a:spcPts val="0"/>
+              </a:spcBef>
+              <a:spcAft>
+                <a:spcPts val="500"/>
+              </a:spcAft>
+              <a:buFont typeface="Arial" panose="020B0604020202020204" pitchFamily="34" charset="0"/>
+              <a:buChar char="•"/>
+            </a:pPr>
+            <a:r>
+              <a:rPr lang="en-CA" dirty="0"/>
+              <a:t>https://www.r-project.org</a:t>
+            </a:r>
+            <a:r>
+              <a:rPr lang="en-CA" dirty="0" smtClean="0"/>
+              <a:t>/</a:t>
+            </a:r>
+          </a:p>
+          <a:p>
+            <a:pPr marL="285750" indent="-285750">
+              <a:spcBef>
+                <a:spcPts val="0"/>
+              </a:spcBef>
+              <a:spcAft>
+                <a:spcPts val="500"/>
+              </a:spcAft>
+              <a:buFont typeface="Arial" panose="020B0604020202020204" pitchFamily="34" charset="0"/>
+              <a:buChar char="•"/>
+            </a:pPr>
+            <a:r>
+              <a:rPr lang="en-US" dirty="0"/>
+              <a:t>https://www.rstudio.com</a:t>
+            </a:r>
             <a:r>
               <a:rPr lang="en-US" dirty="0" smtClean="0"/>
-              <a:t>Software: R </a:t>
+              <a:t>/</a:t>
             </a:r>
           </a:p>
           <a:p>
+            <a:pPr marL="285750" indent="-285750">
+              <a:spcBef>
+                <a:spcPts val="0"/>
+              </a:spcBef>
+              <a:spcAft>
+                <a:spcPts val="500"/>
+              </a:spcAft>
+              <a:buFont typeface="Arial" panose="020B0604020202020204" pitchFamily="34" charset="0"/>
+              <a:buChar char="•"/>
+            </a:pPr>
             <a:r>
-              <a:rPr lang="en-US" dirty="0" smtClean="0"/>
-              <a:t>IDE:R Studio</a:t>
+              <a:rPr lang="en-US" dirty="0"/>
+              <a:t>https://github.com/</a:t>
             </a:r>
-          </a:p>
-          <a:p>
+            <a:endParaRPr lang="en-CA" dirty="0" smtClean="0"/>
+          </a:p>
+          <a:p>
+            <a:pPr marL="285750" indent="-285750">
+              <a:spcBef>
+                <a:spcPts val="0"/>
+              </a:spcBef>
+              <a:spcAft>
+                <a:spcPts val="500"/>
+              </a:spcAft>
+              <a:buFont typeface="Arial" panose="020B0604020202020204" pitchFamily="34" charset="0"/>
+              <a:buChar char="•"/>
+            </a:pPr>
+            <a:r>
+              <a:rPr lang="en-CA" dirty="0"/>
+              <a:t>https://ca.finance.yahoo.com/quote/GIB-A.TO</a:t>
+            </a:r>
             <a:r>
               <a:rPr lang="en-CA" dirty="0" smtClean="0"/>
-              <a:t>Host: Cloud</a:t>
+              <a:t>/</a:t>
             </a:r>
           </a:p>
           <a:p>
+            <a:pPr marL="285750" indent="-285750">
+              <a:spcBef>
+                <a:spcPts val="0"/>
+              </a:spcBef>
+              <a:spcAft>
+                <a:spcPts val="500"/>
+              </a:spcAft>
+              <a:buFont typeface="Arial" panose="020B0604020202020204" pitchFamily="34" charset="0"/>
+              <a:buChar char="•"/>
+            </a:pPr>
             <a:r>
-              <a:rPr lang="en-CA" dirty="0" smtClean="0"/>
-              <a:t>URL</a:t>
+              <a:rPr lang="en-US" dirty="0">
+                <a:cs typeface="Arial" pitchFamily="34" charset="0"/>
+              </a:rPr>
+              <a:t>https://pypl.github.io/PYPL.html</a:t>
             </a:r>
+          </a:p>
+          <a:p>
+            <a:pPr marL="285750" indent="-285750">
+              <a:spcBef>
+                <a:spcPts val="0"/>
+              </a:spcBef>
+              <a:spcAft>
+                <a:spcPts val="500"/>
+              </a:spcAft>
+              <a:buFont typeface="Arial" panose="020B0604020202020204" pitchFamily="34" charset="0"/>
+              <a:buChar char="•"/>
+            </a:pPr>
             <a:r>
-              <a:rPr lang="en-CA" dirty="0"/>
-              <a:t>: https://rstudio.cloud</a:t>
+              <a:rPr lang="en-US" dirty="0">
+                <a:cs typeface="Arial" pitchFamily="34" charset="0"/>
+              </a:rPr>
+              <a:t>https://www.guru99.com/r-programming-introduction-basics.html</a:t>
             </a:r>
-            <a:endParaRPr lang="en-US" dirty="0" smtClean="0"/>
-          </a:p>
-          <a:p>
-            <a:endParaRPr lang="en-US" dirty="0"/>
+          </a:p>
+          <a:p>
+            <a:pPr marL="285750" indent="-285750">
+              <a:spcBef>
+                <a:spcPts val="0"/>
+              </a:spcBef>
+              <a:spcAft>
+                <a:spcPts val="500"/>
+              </a:spcAft>
+              <a:buFont typeface="Arial" panose="020B0604020202020204" pitchFamily="34" charset="0"/>
+              <a:buChar char="•"/>
+            </a:pPr>
+            <a:r>
+              <a:rPr lang="en-US" dirty="0">
+                <a:cs typeface="Arial" pitchFamily="34" charset="0"/>
+              </a:rPr>
+              <a:t>image source — http://bigdatasciencetraining.com/importance-of-learning-r-for-data-science/</a:t>
+            </a:r>
+          </a:p>
+          <a:p>
+            <a:pPr>
+              <a:spcBef>
+                <a:spcPts val="0"/>
+              </a:spcBef>
+              <a:spcAft>
+                <a:spcPts val="500"/>
+              </a:spcAft>
+            </a:pPr>
+            <a:endParaRPr lang="en-CA" dirty="0"/>
           </a:p>
         </p:txBody>
       </p:sp>
       <p:sp>
         <p:nvSpPr>
-          <p:cNvPr id="4" name="Slide Number Placeholder 3"/>
+          <p:cNvPr id="5" name="Slide Number Placeholder 4"/>
           <p:cNvSpPr>
             <a:spLocks noGrp="1"/>
           </p:cNvSpPr>
@@ -26807,7 +27147,15 @@
             <p:ph type="sldNum" sz="quarter" idx="4"/>
           </p:nvPr>
         </p:nvSpPr>
-        <p:spPr/>
+        <p:spPr>
+          <a:xfrm>
+            <a:off x="11323826" y="6555658"/>
+            <a:ext cx="261660" cy="169200"/>
+          </a:xfrm>
+          <a:prstGeom prst="rect">
+            <a:avLst/>
+          </a:prstGeom>
+        </p:spPr>
         <p:txBody>
           <a:bodyPr/>
           <a:lstStyle/>
@@ -26824,7 +27172,7 @@
     </p:spTree>
     <p:extLst>
       <p:ext uri="{BB962C8B-B14F-4D97-AF65-F5344CB8AC3E}">
-        <p14:creationId xmlns:p14="http://schemas.microsoft.com/office/powerpoint/2010/main" val="426337725"/>
+        <p14:creationId xmlns:p14="http://schemas.microsoft.com/office/powerpoint/2010/main" val="933260578"/>
       </p:ext>
     </p:extLst>
   </p:cSld>
@@ -26860,33 +27208,106 @@
       </p:grpSpPr>
       <p:sp>
         <p:nvSpPr>
-          <p:cNvPr id="19" name="Title 18"/>
+          <p:cNvPr id="2" name="Title 1"/>
           <p:cNvSpPr>
             <a:spLocks noGrp="1"/>
           </p:cNvSpPr>
           <p:nvPr>
-            <p:ph type="title"/>
+            <p:ph type="ctrTitle"/>
           </p:nvPr>
         </p:nvSpPr>
-        <p:spPr/>
+        <p:spPr>
+          <a:xfrm>
+            <a:off x="5448301" y="1035107"/>
+            <a:ext cx="6119812" cy="2446092"/>
+          </a:xfrm>
+        </p:spPr>
         <p:txBody>
-          <a:bodyPr anchor="ctr">
-            <a:noAutofit/>
-          </a:bodyPr>
+          <a:bodyPr anchor="t"/>
           <a:lstStyle/>
           <a:p>
-            <a:pPr algn="ctr"/>
             <a:r>
-              <a:rPr lang="en-US" sz="7200" dirty="0" smtClean="0"/>
-              <a:t>Thank you !!!!!!!!</a:t>
+              <a:rPr lang="en-US" dirty="0" smtClean="0"/>
+              <a:t>Demo</a:t>
             </a:r>
-            <a:endParaRPr lang="en-US" sz="7200" dirty="0"/>
+            <a:br>
+              <a:rPr lang="en-US" dirty="0" smtClean="0"/>
+            </a:br>
+            <a:r>
+              <a:rPr lang="en-US" sz="2400" b="1" dirty="0" smtClean="0">
+                <a:solidFill>
+                  <a:schemeClr val="tx1"/>
+                </a:solidFill>
+              </a:rPr>
+              <a:t>Subject: Extracting Script rates from Yahoo finance</a:t>
+            </a:r>
+            <a:r>
+              <a:rPr lang="en-US" dirty="0" smtClean="0"/>
+              <a:t/>
+            </a:r>
+            <a:br>
+              <a:rPr lang="en-US" dirty="0" smtClean="0"/>
+            </a:br>
+            <a:endParaRPr lang="en-US" dirty="0"/>
           </a:p>
         </p:txBody>
       </p:sp>
       <p:sp>
         <p:nvSpPr>
-          <p:cNvPr id="7" name="Slide Number Placeholder 6"/>
+          <p:cNvPr id="16" name="Subtitle 15"/>
+          <p:cNvSpPr>
+            <a:spLocks noGrp="1"/>
+          </p:cNvSpPr>
+          <p:nvPr>
+            <p:ph type="subTitle" idx="1"/>
+          </p:nvPr>
+        </p:nvSpPr>
+        <p:spPr>
+          <a:xfrm>
+            <a:off x="5448302" y="3481199"/>
+            <a:ext cx="6119811" cy="1730881"/>
+          </a:xfrm>
+        </p:spPr>
+        <p:txBody>
+          <a:bodyPr/>
+          <a:lstStyle/>
+          <a:p>
+            <a:r>
+              <a:rPr lang="en-US" dirty="0" smtClean="0"/>
+              <a:t>Software: R </a:t>
+            </a:r>
+          </a:p>
+          <a:p>
+            <a:r>
+              <a:rPr lang="en-US" dirty="0" smtClean="0"/>
+              <a:t>IDE:R Studio</a:t>
+            </a:r>
+          </a:p>
+          <a:p>
+            <a:r>
+              <a:rPr lang="en-CA" dirty="0" smtClean="0"/>
+              <a:t>Host: Cloud</a:t>
+            </a:r>
+          </a:p>
+          <a:p>
+            <a:r>
+              <a:rPr lang="en-CA" dirty="0" smtClean="0"/>
+              <a:t>URL</a:t>
+            </a:r>
+            <a:r>
+              <a:rPr lang="en-CA" dirty="0"/>
+              <a:t>: https://rstudio.cloud</a:t>
+            </a:r>
+            <a:endParaRPr lang="en-US" dirty="0" smtClean="0"/>
+          </a:p>
+          <a:p>
+            <a:endParaRPr lang="en-US" dirty="0"/>
+          </a:p>
+        </p:txBody>
+      </p:sp>
+      <p:sp>
+        <p:nvSpPr>
+          <p:cNvPr id="4" name="Slide Number Placeholder 3"/>
           <p:cNvSpPr>
             <a:spLocks noGrp="1"/>
           </p:cNvSpPr>
@@ -26911,7 +27332,7 @@
     </p:spTree>
     <p:extLst>
       <p:ext uri="{BB962C8B-B14F-4D97-AF65-F5344CB8AC3E}">
-        <p14:creationId xmlns:p14="http://schemas.microsoft.com/office/powerpoint/2010/main" val="24715724"/>
+        <p14:creationId xmlns:p14="http://schemas.microsoft.com/office/powerpoint/2010/main" val="426337725"/>
       </p:ext>
     </p:extLst>
   </p:cSld>
@@ -26947,37 +27368,33 @@
       </p:grpSpPr>
       <p:sp>
         <p:nvSpPr>
-          <p:cNvPr id="2" name="Title 1"/>
+          <p:cNvPr id="19" name="Title 18"/>
           <p:cNvSpPr>
             <a:spLocks noGrp="1"/>
           </p:cNvSpPr>
           <p:nvPr>
-            <p:ph type="ctrTitle"/>
+            <p:ph type="title"/>
           </p:nvPr>
         </p:nvSpPr>
         <p:spPr/>
         <p:txBody>
           <a:bodyPr anchor="ctr">
-            <a:normAutofit/>
+            <a:noAutofit/>
           </a:bodyPr>
           <a:lstStyle/>
           <a:p>
             <a:pPr algn="ctr"/>
             <a:r>
               <a:rPr lang="en-US" sz="7200" dirty="0" smtClean="0"/>
-              <a:t>Q&amp;A</a:t>
+              <a:t>Thank you !!!!!!!!</a:t>
             </a:r>
-            <a:endParaRPr lang="en-US" sz="6000" dirty="0">
-              <a:solidFill>
-                <a:schemeClr val="tx1"/>
-              </a:solidFill>
-            </a:endParaRPr>
+            <a:endParaRPr lang="en-US" sz="7200" dirty="0"/>
           </a:p>
         </p:txBody>
       </p:sp>
       <p:sp>
         <p:nvSpPr>
-          <p:cNvPr id="4" name="Slide Number Placeholder 3"/>
+          <p:cNvPr id="7" name="Slide Number Placeholder 6"/>
           <p:cNvSpPr>
             <a:spLocks noGrp="1"/>
           </p:cNvSpPr>
@@ -26999,33 +27416,10 @@
           </a:p>
         </p:txBody>
       </p:sp>
-      <p:sp>
-        <p:nvSpPr>
-          <p:cNvPr id="3" name="Footer Placeholder 2"/>
-          <p:cNvSpPr>
-            <a:spLocks noGrp="1"/>
-          </p:cNvSpPr>
-          <p:nvPr>
-            <p:ph type="ftr" sz="quarter" idx="3"/>
-          </p:nvPr>
-        </p:nvSpPr>
-        <p:spPr/>
-        <p:txBody>
-          <a:bodyPr/>
-          <a:lstStyle/>
-          <a:p>
-            <a:r>
-              <a:rPr lang="en-US" dirty="0" smtClean="0"/>
-              <a:t>Footer appears here, if required</a:t>
-            </a:r>
-            <a:endParaRPr lang="en-US" dirty="0"/>
-          </a:p>
-        </p:txBody>
-      </p:sp>
     </p:spTree>
     <p:extLst>
       <p:ext uri="{BB962C8B-B14F-4D97-AF65-F5344CB8AC3E}">
-        <p14:creationId xmlns:p14="http://schemas.microsoft.com/office/powerpoint/2010/main" val="96958150"/>
+        <p14:creationId xmlns:p14="http://schemas.microsoft.com/office/powerpoint/2010/main" val="24715724"/>
       </p:ext>
     </p:extLst>
   </p:cSld>
@@ -28083,84 +28477,139 @@
 </file>
 
 <file path=customXml/item2.xml><?xml version="1.0" encoding="utf-8"?>
-<p:properties xmlns:p="http://schemas.microsoft.com/office/2006/metadata/properties" xmlns:xsi="http://www.w3.org/2001/XMLSchema-instance">
-  <documentManagement>
-    <c5aebc35b3e840e5912c276ffe755dcf xmlns="d95a5b16-1b8d-4c7c-9ebf-89c0983b6970">
-      <Terms xmlns="http://schemas.microsoft.com/office/infopath/2007/PartnerControls"/>
-    </c5aebc35b3e840e5912c276ffe755dcf>
-    <c79d12643ffc4d60ab657aaa1718cc32 xmlns="d95a5b16-1b8d-4c7c-9ebf-89c0983b6970">
-      <Terms xmlns="http://schemas.microsoft.com/office/infopath/2007/PartnerControls">
-        <TermInfo xmlns="http://schemas.microsoft.com/office/infopath/2007/PartnerControls">
-          <TermName xmlns="http://schemas.microsoft.com/office/infopath/2007/PartnerControls">Corporate</TermName>
-          <TermId xmlns="http://schemas.microsoft.com/office/infopath/2007/PartnerControls">43ac7042-3752-4f1b-8a93-43b36e65d3e5</TermId>
-        </TermInfo>
-      </Terms>
-    </c79d12643ffc4d60ab657aaa1718cc32>
-    <p43f7bb208e443c9b50eb304fe6606a3 xmlns="d95a5b16-1b8d-4c7c-9ebf-89c0983b6970">
-      <Terms xmlns="http://schemas.microsoft.com/office/infopath/2007/PartnerControls"/>
-    </p43f7bb208e443c9b50eb304fe6606a3>
-    <TaxCatchAll xmlns="d95a5b16-1b8d-4c7c-9ebf-89c0983b6970">
-      <Value>260</Value>
-      <Value>46118</Value>
-      <Value>3697</Value>
-      <Value>46486</Value>
-    </TaxCatchAll>
-    <eafb632c3f5c40ba98242be6bbd6bb17 xmlns="d95a5b16-1b8d-4c7c-9ebf-89c0983b6970">
-      <Terms xmlns="http://schemas.microsoft.com/office/infopath/2007/PartnerControls"/>
-    </eafb632c3f5c40ba98242be6bbd6bb17>
-    <b0f7c43cb32a4bb99696cc0157e407bc xmlns="d95a5b16-1b8d-4c7c-9ebf-89c0983b6970">
-      <Terms xmlns="http://schemas.microsoft.com/office/infopath/2007/PartnerControls"/>
-    </b0f7c43cb32a4bb99696cc0157e407bc>
-    <gd9a5f5f69a84d75ad992b5cd341c76b xmlns="d95a5b16-1b8d-4c7c-9ebf-89c0983b6970">
-      <Terms xmlns="http://schemas.microsoft.com/office/infopath/2007/PartnerControls"/>
-    </gd9a5f5f69a84d75ad992b5cd341c76b>
-    <o5847c86b23d428c853490e0a9abf024 xmlns="d95a5b16-1b8d-4c7c-9ebf-89c0983b6970">
-      <Terms xmlns="http://schemas.microsoft.com/office/infopath/2007/PartnerControls"/>
-    </o5847c86b23d428c853490e0a9abf024>
-    <kbc8ce58d0914d5e9641963f23cd2adf xmlns="d95a5b16-1b8d-4c7c-9ebf-89c0983b6970">
-      <Terms xmlns="http://schemas.microsoft.com/office/infopath/2007/PartnerControls">
-        <TermInfo xmlns="http://schemas.microsoft.com/office/infopath/2007/PartnerControls">
-          <TermName xmlns="http://schemas.microsoft.com/office/infopath/2007/PartnerControls">Communications ＆ Investor Relations</TermName>
-          <TermId xmlns="http://schemas.microsoft.com/office/infopath/2007/PartnerControls">fb65bde5-f439-4af8-aaa0-dcf1364d6414</TermId>
-        </TermInfo>
-      </Terms>
-    </kbc8ce58d0914d5e9641963f23cd2adf>
-    <ae4bb7bb5e1849a3a75b9d2ac781ba53 xmlns="d95a5b16-1b8d-4c7c-9ebf-89c0983b6970">
-      <Terms xmlns="http://schemas.microsoft.com/office/infopath/2007/PartnerControls">
-        <TermInfo xmlns="http://schemas.microsoft.com/office/infopath/2007/PartnerControls">
-          <TermName xmlns="http://schemas.microsoft.com/office/infopath/2007/PartnerControls">Brand template</TermName>
-          <TermId xmlns="http://schemas.microsoft.com/office/infopath/2007/PartnerControls">a8dae13e-44bb-4ec1-860e-cc2305177641</TermId>
-        </TermInfo>
-      </Terms>
-    </ae4bb7bb5e1849a3a75b9d2ac781ba53>
-    <Creator xmlns="d95a5b16-1b8d-4c7c-9ebf-89c0983b6970" xsi:nil="true"/>
-    <Language xmlns="http://schemas.microsoft.com/sharepoint/v3">EN</Language>
-    <CSMeta2010Field xmlns="http://schemas.microsoft.com/sharepoint/v3">cf78e423-0039-41cd-b5ec-35c354449ae3;2019-08-12 17:17:32;PARTIALMANUALCLASSIFIED;Topic:2019-08-12 17:17:32|False||AUTOCLASSIFIED|2019-08-12 17:17:32|UNDEFINED|00000000-0000-0000-0000-000000000000;Organization:2018-06-14 16:30:37|False|2018-06-14 16:34:19|MANUALCLASSIFIED|2018-06-14 16:34:19|UNDEFINED|00000000-0000-0000-0000-000000000000;Industry:2019-08-12 17:17:32|False||AUTOCLASSIFIED|2019-08-12 17:17:32|UNDEFINED|00000000-0000-0000-0000-000000000000;Service line:2019-08-12 17:17:32|False||AUTOCLASSIFIED|2019-08-12 17:17:32|UNDEFINED|00000000-0000-0000-0000-000000000000;Business Practice:2019-08-12 17:17:32|False||AUTOCLASSIFIED|2019-08-12 17:17:32|UNDEFINED|00000000-0000-0000-0000-000000000000;Intellectual Property:2019-08-12 17:17:32|False||AUTOCLASSIFIED|2019-08-12 17:17:32|UNDEFINED|00000000-0000-0000-0000-000000000000;Content Format:2018-06-14 16:30:37|False|2018-06-14 16:34:19|MANUALCLASSIFIED|2018-06-14 16:34:19|UNDEFINED|00000000-0000-0000-0000-000000000000;Functions:2019-08-12 17:17:32|False||AUTOCLASSIFIED|2019-08-12 17:17:32|UNDEFINED|00000000-0000-0000-0000-000000000000;Geography:2019-08-12 17:17:32|False||AUTOCLASSIFIED|2019-08-12 17:17:32|UNDEFINED|00000000-0000-0000-0000-000000000000;False</CSMeta2010Field>
-    <Abstract xmlns="d95a5b16-1b8d-4c7c-9ebf-89c0983b6970">CGI widescreen graphic PowerPoint template - English version</Abstract>
-    <External_x0020_Use xmlns="d95a5b16-1b8d-4c7c-9ebf-89c0983b6970">No</External_x0020_Use>
-    <Owner_x0020_Organisation xmlns="d95a5b16-1b8d-4c7c-9ebf-89c0983b6970">Group</Owner_x0020_Organisation>
-    <BS_x0020_Document_x0020_Sub_x0020_Type xmlns="d95a5b16-1b8d-4c7c-9ebf-89c0983b6970">Business Aid</BS_x0020_Document_x0020_Sub_x0020_Type>
-    <Market xmlns="d95a5b16-1b8d-4c7c-9ebf-89c0983b6970"/>
-    <TaxKeywordTaxHTField xmlns="d95a5b16-1b8d-4c7c-9ebf-89c0983b6970">
-      <Terms xmlns="http://schemas.microsoft.com/office/infopath/2007/PartnerControls">
-        <TermInfo xmlns="http://schemas.microsoft.com/office/infopath/2007/PartnerControls">
-          <TermName xmlns="http://schemas.microsoft.com/office/infopath/2007/PartnerControls">PowerPoint</TermName>
-          <TermId xmlns="http://schemas.microsoft.com/office/infopath/2007/PartnerControls">5b4ca844-900d-4151-9c88-1a4b47550bee</TermId>
-        </TermInfo>
-      </Terms>
-    </TaxKeywordTaxHTField>
-    <Best_x0020_Before_x0020_Date xmlns="d95a5b16-1b8d-4c7c-9ebf-89c0983b6970">2023-06-13T23:00:00+00:00</Best_x0020_Before_x0020_Date>
-    <Published_x0020_By xmlns="d95a5b16-1b8d-4c7c-9ebf-89c0983b6970">
-      <UserInfo>
-        <DisplayName>Stiller, Regina C</DisplayName>
-        <AccountId>55167</AccountId>
-        <AccountType/>
-      </UserInfo>
-    </Published_x0020_By>
-    <Publication_x0020_Date xmlns="d95a5b16-1b8d-4c7c-9ebf-89c0983b6970">2018-06-13T23:00:00+00:00</Publication_x0020_Date>
-    <Geographic_x0020_Region xmlns="d95a5b16-1b8d-4c7c-9ebf-89c0983b6970"/>
-  </documentManagement>
-</p:properties>
+<?mso-contentType ?>
+<spe:Receivers xmlns:spe="http://schemas.microsoft.com/sharepoint/events">
+  <Receiver>
+    <Name>ItemUpdatedEventHandlerForConceptSearch</Name>
+    <Synchronization>Default</Synchronization>
+    <Type>10002</Type>
+    <SequenceNumber>10001</SequenceNumber>
+    <Assembly>conceptSearching.Sharepoint.ContentTypes, Version=1.0.0.0, Culture=neutral, PublicKeyToken=858f8f13980e4745</Assembly>
+    <Class>conceptSearching.Sharepoint.ContentTypes.CSHandleEvent</Class>
+    <Data/>
+    <Filter/>
+  </Receiver>
+  <Receiver>
+    <Name>ItemCheckedInEventHandlerForConceptSearch</Name>
+    <Synchronization>Default</Synchronization>
+    <Type>10004</Type>
+    <SequenceNumber>10002</SequenceNumber>
+    <Assembly>conceptSearching.Sharepoint.ContentTypes, Version=1.0.0.0, Culture=neutral, PublicKeyToken=858f8f13980e4745</Assembly>
+    <Class>conceptSearching.Sharepoint.ContentTypes.CSHandleEvent</Class>
+    <Data/>
+    <Filter/>
+  </Receiver>
+  <Receiver>
+    <Name>ItemUncheckedOutEventHandlerForConceptSearch</Name>
+    <Synchronization>Default</Synchronization>
+    <Type>10006</Type>
+    <SequenceNumber>10003</SequenceNumber>
+    <Assembly>conceptSearching.Sharepoint.ContentTypes, Version=1.0.0.0, Culture=neutral, PublicKeyToken=858f8f13980e4745</Assembly>
+    <Class>conceptSearching.Sharepoint.ContentTypes.CSHandleEvent</Class>
+    <Data/>
+    <Filter/>
+  </Receiver>
+  <Receiver>
+    <Name>ItemAddedEventHandlerForConceptSearch</Name>
+    <Synchronization>Default</Synchronization>
+    <Type>10001</Type>
+    <SequenceNumber>10004</SequenceNumber>
+    <Assembly>conceptSearching.Sharepoint.ContentTypes, Version=1.0.0.0, Culture=neutral, PublicKeyToken=858f8f13980e4745</Assembly>
+    <Class>conceptSearching.Sharepoint.ContentTypes.CSHandleEvent</Class>
+    <Data/>
+    <Filter/>
+  </Receiver>
+  <Receiver>
+    <Name>ItemFileMovedEventHandlerForConceptSearch</Name>
+    <Synchronization>Default</Synchronization>
+    <Type>10009</Type>
+    <SequenceNumber>10005</SequenceNumber>
+    <Assembly>conceptSearching.Sharepoint.ContentTypes, Version=1.0.0.0, Culture=neutral, PublicKeyToken=858f8f13980e4745</Assembly>
+    <Class>conceptSearching.Sharepoint.ContentTypes.CSHandleEvent</Class>
+    <Data/>
+    <Filter/>
+  </Receiver>
+  <Receiver>
+    <Name>ItemDeletedEventHandlerForConceptSearch</Name>
+    <Synchronization>Default</Synchronization>
+    <Type>10003</Type>
+    <SequenceNumber>10006</SequenceNumber>
+    <Assembly>conceptSearching.Sharepoint.ContentTypes, Version=1.0.0.0, Culture=neutral, PublicKeyToken=858f8f13980e4745</Assembly>
+    <Class>conceptSearching.Sharepoint.ContentTypes.CSHandleEvent</Class>
+    <Data/>
+    <Filter/>
+  </Receiver>
+  <Receiver>
+    <Name>ItemUpdatedEventHandlerForConceptSearch</Name>
+    <Synchronization>Asynchronous</Synchronization>
+    <Type>10002</Type>
+    <SequenceNumber>10001</SequenceNumber>
+    <Assembly>conceptSearching.Sharepoint.ContentTypes2010, Version=1.0.0.0, Culture=neutral, PublicKeyToken=858f8f13980e4745</Assembly>
+    <Class>conceptSearching.Sharepoint.ContentTypes2010.CSHandleEvent</Class>
+    <Data/>
+    <Filter/>
+  </Receiver>
+  <Receiver>
+    <Name>ItemUpdatingEventHandlerForConceptSearch</Name>
+    <Synchronization>Synchronous</Synchronization>
+    <Type>2</Type>
+    <SequenceNumber>10001</SequenceNumber>
+    <Assembly>conceptSearching.Sharepoint.ContentTypes2010, Version=1.0.0.0, Culture=neutral, PublicKeyToken=858f8f13980e4745</Assembly>
+    <Class>conceptSearching.Sharepoint.ContentTypes2010.CSHandleEvent</Class>
+    <Data/>
+    <Filter/>
+  </Receiver>
+  <Receiver>
+    <Name>ItemCheckedInEventHandlerForConceptSearch</Name>
+    <Synchronization>Asynchronous</Synchronization>
+    <Type>10004</Type>
+    <SequenceNumber>10002</SequenceNumber>
+    <Assembly>conceptSearching.Sharepoint.ContentTypes2010, Version=1.0.0.0, Culture=neutral, PublicKeyToken=858f8f13980e4745</Assembly>
+    <Class>conceptSearching.Sharepoint.ContentTypes2010.CSHandleEvent</Class>
+    <Data/>
+    <Filter/>
+  </Receiver>
+  <Receiver>
+    <Name>ItemUncheckedOutEventHandlerForConceptSearch</Name>
+    <Synchronization>Asynchronous</Synchronization>
+    <Type>10006</Type>
+    <SequenceNumber>10003</SequenceNumber>
+    <Assembly>conceptSearching.Sharepoint.ContentTypes2010, Version=1.0.0.0, Culture=neutral, PublicKeyToken=858f8f13980e4745</Assembly>
+    <Class>conceptSearching.Sharepoint.ContentTypes2010.CSHandleEvent</Class>
+    <Data/>
+    <Filter/>
+  </Receiver>
+  <Receiver>
+    <Name>ItemAddedEventHandlerForConceptSearch</Name>
+    <Synchronization>Asynchronous</Synchronization>
+    <Type>10001</Type>
+    <SequenceNumber>10004</SequenceNumber>
+    <Assembly>conceptSearching.Sharepoint.ContentTypes2010, Version=1.0.0.0, Culture=neutral, PublicKeyToken=858f8f13980e4745</Assembly>
+    <Class>conceptSearching.Sharepoint.ContentTypes2010.CSHandleEvent</Class>
+    <Data/>
+    <Filter/>
+  </Receiver>
+  <Receiver>
+    <Name>ItemFileMovedEventHandlerForConceptSearch</Name>
+    <Synchronization>Asynchronous</Synchronization>
+    <Type>10009</Type>
+    <SequenceNumber>10005</SequenceNumber>
+    <Assembly>conceptSearching.Sharepoint.ContentTypes2010, Version=1.0.0.0, Culture=neutral, PublicKeyToken=858f8f13980e4745</Assembly>
+    <Class>conceptSearching.Sharepoint.ContentTypes2010.CSHandleEvent</Class>
+    <Data/>
+    <Filter/>
+  </Receiver>
+  <Receiver>
+    <Name>ItemDeletedEventHandlerForConceptSearch</Name>
+    <Synchronization>Asynchronous</Synchronization>
+    <Type>10003</Type>
+    <SequenceNumber>10006</SequenceNumber>
+    <Assembly>conceptSearching.Sharepoint.ContentTypes2010, Version=1.0.0.0, Culture=neutral, PublicKeyToken=858f8f13980e4745</Assembly>
+    <Class>conceptSearching.Sharepoint.ContentTypes2010.CSHandleEvent</Class>
+    <Data/>
+    <Filter/>
+  </Receiver>
+</spe:Receivers>
 </file>
 
 <file path=customXml/item3.xml><?xml version="1.0" encoding="utf-8"?>
@@ -28612,139 +29061,84 @@
 </file>
 
 <file path=customXml/item4.xml><?xml version="1.0" encoding="utf-8"?>
-<?mso-contentType ?>
-<spe:Receivers xmlns:spe="http://schemas.microsoft.com/sharepoint/events">
-  <Receiver>
-    <Name>ItemUpdatedEventHandlerForConceptSearch</Name>
-    <Synchronization>Default</Synchronization>
-    <Type>10002</Type>
-    <SequenceNumber>10001</SequenceNumber>
-    <Assembly>conceptSearching.Sharepoint.ContentTypes, Version=1.0.0.0, Culture=neutral, PublicKeyToken=858f8f13980e4745</Assembly>
-    <Class>conceptSearching.Sharepoint.ContentTypes.CSHandleEvent</Class>
-    <Data/>
-    <Filter/>
-  </Receiver>
-  <Receiver>
-    <Name>ItemCheckedInEventHandlerForConceptSearch</Name>
-    <Synchronization>Default</Synchronization>
-    <Type>10004</Type>
-    <SequenceNumber>10002</SequenceNumber>
-    <Assembly>conceptSearching.Sharepoint.ContentTypes, Version=1.0.0.0, Culture=neutral, PublicKeyToken=858f8f13980e4745</Assembly>
-    <Class>conceptSearching.Sharepoint.ContentTypes.CSHandleEvent</Class>
-    <Data/>
-    <Filter/>
-  </Receiver>
-  <Receiver>
-    <Name>ItemUncheckedOutEventHandlerForConceptSearch</Name>
-    <Synchronization>Default</Synchronization>
-    <Type>10006</Type>
-    <SequenceNumber>10003</SequenceNumber>
-    <Assembly>conceptSearching.Sharepoint.ContentTypes, Version=1.0.0.0, Culture=neutral, PublicKeyToken=858f8f13980e4745</Assembly>
-    <Class>conceptSearching.Sharepoint.ContentTypes.CSHandleEvent</Class>
-    <Data/>
-    <Filter/>
-  </Receiver>
-  <Receiver>
-    <Name>ItemAddedEventHandlerForConceptSearch</Name>
-    <Synchronization>Default</Synchronization>
-    <Type>10001</Type>
-    <SequenceNumber>10004</SequenceNumber>
-    <Assembly>conceptSearching.Sharepoint.ContentTypes, Version=1.0.0.0, Culture=neutral, PublicKeyToken=858f8f13980e4745</Assembly>
-    <Class>conceptSearching.Sharepoint.ContentTypes.CSHandleEvent</Class>
-    <Data/>
-    <Filter/>
-  </Receiver>
-  <Receiver>
-    <Name>ItemFileMovedEventHandlerForConceptSearch</Name>
-    <Synchronization>Default</Synchronization>
-    <Type>10009</Type>
-    <SequenceNumber>10005</SequenceNumber>
-    <Assembly>conceptSearching.Sharepoint.ContentTypes, Version=1.0.0.0, Culture=neutral, PublicKeyToken=858f8f13980e4745</Assembly>
-    <Class>conceptSearching.Sharepoint.ContentTypes.CSHandleEvent</Class>
-    <Data/>
-    <Filter/>
-  </Receiver>
-  <Receiver>
-    <Name>ItemDeletedEventHandlerForConceptSearch</Name>
-    <Synchronization>Default</Synchronization>
-    <Type>10003</Type>
-    <SequenceNumber>10006</SequenceNumber>
-    <Assembly>conceptSearching.Sharepoint.ContentTypes, Version=1.0.0.0, Culture=neutral, PublicKeyToken=858f8f13980e4745</Assembly>
-    <Class>conceptSearching.Sharepoint.ContentTypes.CSHandleEvent</Class>
-    <Data/>
-    <Filter/>
-  </Receiver>
-  <Receiver>
-    <Name>ItemUpdatedEventHandlerForConceptSearch</Name>
-    <Synchronization>Asynchronous</Synchronization>
-    <Type>10002</Type>
-    <SequenceNumber>10001</SequenceNumber>
-    <Assembly>conceptSearching.Sharepoint.ContentTypes2010, Version=1.0.0.0, Culture=neutral, PublicKeyToken=858f8f13980e4745</Assembly>
-    <Class>conceptSearching.Sharepoint.ContentTypes2010.CSHandleEvent</Class>
-    <Data/>
-    <Filter/>
-  </Receiver>
-  <Receiver>
-    <Name>ItemUpdatingEventHandlerForConceptSearch</Name>
-    <Synchronization>Synchronous</Synchronization>
-    <Type>2</Type>
-    <SequenceNumber>10001</SequenceNumber>
-    <Assembly>conceptSearching.Sharepoint.ContentTypes2010, Version=1.0.0.0, Culture=neutral, PublicKeyToken=858f8f13980e4745</Assembly>
-    <Class>conceptSearching.Sharepoint.ContentTypes2010.CSHandleEvent</Class>
-    <Data/>
-    <Filter/>
-  </Receiver>
-  <Receiver>
-    <Name>ItemCheckedInEventHandlerForConceptSearch</Name>
-    <Synchronization>Asynchronous</Synchronization>
-    <Type>10004</Type>
-    <SequenceNumber>10002</SequenceNumber>
-    <Assembly>conceptSearching.Sharepoint.ContentTypes2010, Version=1.0.0.0, Culture=neutral, PublicKeyToken=858f8f13980e4745</Assembly>
-    <Class>conceptSearching.Sharepoint.ContentTypes2010.CSHandleEvent</Class>
-    <Data/>
-    <Filter/>
-  </Receiver>
-  <Receiver>
-    <Name>ItemUncheckedOutEventHandlerForConceptSearch</Name>
-    <Synchronization>Asynchronous</Synchronization>
-    <Type>10006</Type>
-    <SequenceNumber>10003</SequenceNumber>
-    <Assembly>conceptSearching.Sharepoint.ContentTypes2010, Version=1.0.0.0, Culture=neutral, PublicKeyToken=858f8f13980e4745</Assembly>
-    <Class>conceptSearching.Sharepoint.ContentTypes2010.CSHandleEvent</Class>
-    <Data/>
-    <Filter/>
-  </Receiver>
-  <Receiver>
-    <Name>ItemAddedEventHandlerForConceptSearch</Name>
-    <Synchronization>Asynchronous</Synchronization>
-    <Type>10001</Type>
-    <SequenceNumber>10004</SequenceNumber>
-    <Assembly>conceptSearching.Sharepoint.ContentTypes2010, Version=1.0.0.0, Culture=neutral, PublicKeyToken=858f8f13980e4745</Assembly>
-    <Class>conceptSearching.Sharepoint.ContentTypes2010.CSHandleEvent</Class>
-    <Data/>
-    <Filter/>
-  </Receiver>
-  <Receiver>
-    <Name>ItemFileMovedEventHandlerForConceptSearch</Name>
-    <Synchronization>Asynchronous</Synchronization>
-    <Type>10009</Type>
-    <SequenceNumber>10005</SequenceNumber>
-    <Assembly>conceptSearching.Sharepoint.ContentTypes2010, Version=1.0.0.0, Culture=neutral, PublicKeyToken=858f8f13980e4745</Assembly>
-    <Class>conceptSearching.Sharepoint.ContentTypes2010.CSHandleEvent</Class>
-    <Data/>
-    <Filter/>
-  </Receiver>
-  <Receiver>
-    <Name>ItemDeletedEventHandlerForConceptSearch</Name>
-    <Synchronization>Asynchronous</Synchronization>
-    <Type>10003</Type>
-    <SequenceNumber>10006</SequenceNumber>
-    <Assembly>conceptSearching.Sharepoint.ContentTypes2010, Version=1.0.0.0, Culture=neutral, PublicKeyToken=858f8f13980e4745</Assembly>
-    <Class>conceptSearching.Sharepoint.ContentTypes2010.CSHandleEvent</Class>
-    <Data/>
-    <Filter/>
-  </Receiver>
-</spe:Receivers>
+<p:properties xmlns:p="http://schemas.microsoft.com/office/2006/metadata/properties" xmlns:xsi="http://www.w3.org/2001/XMLSchema-instance">
+  <documentManagement>
+    <c5aebc35b3e840e5912c276ffe755dcf xmlns="d95a5b16-1b8d-4c7c-9ebf-89c0983b6970">
+      <Terms xmlns="http://schemas.microsoft.com/office/infopath/2007/PartnerControls"/>
+    </c5aebc35b3e840e5912c276ffe755dcf>
+    <c79d12643ffc4d60ab657aaa1718cc32 xmlns="d95a5b16-1b8d-4c7c-9ebf-89c0983b6970">
+      <Terms xmlns="http://schemas.microsoft.com/office/infopath/2007/PartnerControls">
+        <TermInfo xmlns="http://schemas.microsoft.com/office/infopath/2007/PartnerControls">
+          <TermName xmlns="http://schemas.microsoft.com/office/infopath/2007/PartnerControls">Corporate</TermName>
+          <TermId xmlns="http://schemas.microsoft.com/office/infopath/2007/PartnerControls">43ac7042-3752-4f1b-8a93-43b36e65d3e5</TermId>
+        </TermInfo>
+      </Terms>
+    </c79d12643ffc4d60ab657aaa1718cc32>
+    <p43f7bb208e443c9b50eb304fe6606a3 xmlns="d95a5b16-1b8d-4c7c-9ebf-89c0983b6970">
+      <Terms xmlns="http://schemas.microsoft.com/office/infopath/2007/PartnerControls"/>
+    </p43f7bb208e443c9b50eb304fe6606a3>
+    <TaxCatchAll xmlns="d95a5b16-1b8d-4c7c-9ebf-89c0983b6970">
+      <Value>260</Value>
+      <Value>46118</Value>
+      <Value>3697</Value>
+      <Value>46486</Value>
+    </TaxCatchAll>
+    <eafb632c3f5c40ba98242be6bbd6bb17 xmlns="d95a5b16-1b8d-4c7c-9ebf-89c0983b6970">
+      <Terms xmlns="http://schemas.microsoft.com/office/infopath/2007/PartnerControls"/>
+    </eafb632c3f5c40ba98242be6bbd6bb17>
+    <b0f7c43cb32a4bb99696cc0157e407bc xmlns="d95a5b16-1b8d-4c7c-9ebf-89c0983b6970">
+      <Terms xmlns="http://schemas.microsoft.com/office/infopath/2007/PartnerControls"/>
+    </b0f7c43cb32a4bb99696cc0157e407bc>
+    <gd9a5f5f69a84d75ad992b5cd341c76b xmlns="d95a5b16-1b8d-4c7c-9ebf-89c0983b6970">
+      <Terms xmlns="http://schemas.microsoft.com/office/infopath/2007/PartnerControls"/>
+    </gd9a5f5f69a84d75ad992b5cd341c76b>
+    <o5847c86b23d428c853490e0a9abf024 xmlns="d95a5b16-1b8d-4c7c-9ebf-89c0983b6970">
+      <Terms xmlns="http://schemas.microsoft.com/office/infopath/2007/PartnerControls"/>
+    </o5847c86b23d428c853490e0a9abf024>
+    <kbc8ce58d0914d5e9641963f23cd2adf xmlns="d95a5b16-1b8d-4c7c-9ebf-89c0983b6970">
+      <Terms xmlns="http://schemas.microsoft.com/office/infopath/2007/PartnerControls">
+        <TermInfo xmlns="http://schemas.microsoft.com/office/infopath/2007/PartnerControls">
+          <TermName xmlns="http://schemas.microsoft.com/office/infopath/2007/PartnerControls">Communications ＆ Investor Relations</TermName>
+          <TermId xmlns="http://schemas.microsoft.com/office/infopath/2007/PartnerControls">fb65bde5-f439-4af8-aaa0-dcf1364d6414</TermId>
+        </TermInfo>
+      </Terms>
+    </kbc8ce58d0914d5e9641963f23cd2adf>
+    <ae4bb7bb5e1849a3a75b9d2ac781ba53 xmlns="d95a5b16-1b8d-4c7c-9ebf-89c0983b6970">
+      <Terms xmlns="http://schemas.microsoft.com/office/infopath/2007/PartnerControls">
+        <TermInfo xmlns="http://schemas.microsoft.com/office/infopath/2007/PartnerControls">
+          <TermName xmlns="http://schemas.microsoft.com/office/infopath/2007/PartnerControls">Brand template</TermName>
+          <TermId xmlns="http://schemas.microsoft.com/office/infopath/2007/PartnerControls">a8dae13e-44bb-4ec1-860e-cc2305177641</TermId>
+        </TermInfo>
+      </Terms>
+    </ae4bb7bb5e1849a3a75b9d2ac781ba53>
+    <Creator xmlns="d95a5b16-1b8d-4c7c-9ebf-89c0983b6970" xsi:nil="true"/>
+    <Language xmlns="http://schemas.microsoft.com/sharepoint/v3">EN</Language>
+    <CSMeta2010Field xmlns="http://schemas.microsoft.com/sharepoint/v3">cf78e423-0039-41cd-b5ec-35c354449ae3;2019-08-12 17:17:32;PARTIALMANUALCLASSIFIED;Topic:2019-08-12 17:17:32|False||AUTOCLASSIFIED|2019-08-12 17:17:32|UNDEFINED|00000000-0000-0000-0000-000000000000;Organization:2018-06-14 16:30:37|False|2018-06-14 16:34:19|MANUALCLASSIFIED|2018-06-14 16:34:19|UNDEFINED|00000000-0000-0000-0000-000000000000;Industry:2019-08-12 17:17:32|False||AUTOCLASSIFIED|2019-08-12 17:17:32|UNDEFINED|00000000-0000-0000-0000-000000000000;Service line:2019-08-12 17:17:32|False||AUTOCLASSIFIED|2019-08-12 17:17:32|UNDEFINED|00000000-0000-0000-0000-000000000000;Business Practice:2019-08-12 17:17:32|False||AUTOCLASSIFIED|2019-08-12 17:17:32|UNDEFINED|00000000-0000-0000-0000-000000000000;Intellectual Property:2019-08-12 17:17:32|False||AUTOCLASSIFIED|2019-08-12 17:17:32|UNDEFINED|00000000-0000-0000-0000-000000000000;Content Format:2018-06-14 16:30:37|False|2018-06-14 16:34:19|MANUALCLASSIFIED|2018-06-14 16:34:19|UNDEFINED|00000000-0000-0000-0000-000000000000;Functions:2019-08-12 17:17:32|False||AUTOCLASSIFIED|2019-08-12 17:17:32|UNDEFINED|00000000-0000-0000-0000-000000000000;Geography:2019-08-12 17:17:32|False||AUTOCLASSIFIED|2019-08-12 17:17:32|UNDEFINED|00000000-0000-0000-0000-000000000000;False</CSMeta2010Field>
+    <Abstract xmlns="d95a5b16-1b8d-4c7c-9ebf-89c0983b6970">CGI widescreen graphic PowerPoint template - English version</Abstract>
+    <External_x0020_Use xmlns="d95a5b16-1b8d-4c7c-9ebf-89c0983b6970">No</External_x0020_Use>
+    <Owner_x0020_Organisation xmlns="d95a5b16-1b8d-4c7c-9ebf-89c0983b6970">Group</Owner_x0020_Organisation>
+    <BS_x0020_Document_x0020_Sub_x0020_Type xmlns="d95a5b16-1b8d-4c7c-9ebf-89c0983b6970">Business Aid</BS_x0020_Document_x0020_Sub_x0020_Type>
+    <Market xmlns="d95a5b16-1b8d-4c7c-9ebf-89c0983b6970"/>
+    <TaxKeywordTaxHTField xmlns="d95a5b16-1b8d-4c7c-9ebf-89c0983b6970">
+      <Terms xmlns="http://schemas.microsoft.com/office/infopath/2007/PartnerControls">
+        <TermInfo xmlns="http://schemas.microsoft.com/office/infopath/2007/PartnerControls">
+          <TermName xmlns="http://schemas.microsoft.com/office/infopath/2007/PartnerControls">PowerPoint</TermName>
+          <TermId xmlns="http://schemas.microsoft.com/office/infopath/2007/PartnerControls">5b4ca844-900d-4151-9c88-1a4b47550bee</TermId>
+        </TermInfo>
+      </Terms>
+    </TaxKeywordTaxHTField>
+    <Best_x0020_Before_x0020_Date xmlns="d95a5b16-1b8d-4c7c-9ebf-89c0983b6970">2023-06-13T23:00:00+00:00</Best_x0020_Before_x0020_Date>
+    <Published_x0020_By xmlns="d95a5b16-1b8d-4c7c-9ebf-89c0983b6970">
+      <UserInfo>
+        <DisplayName>Stiller, Regina C</DisplayName>
+        <AccountId>55167</AccountId>
+        <AccountType/>
+      </UserInfo>
+    </Published_x0020_By>
+    <Publication_x0020_Date xmlns="d95a5b16-1b8d-4c7c-9ebf-89c0983b6970">2018-06-13T23:00:00+00:00</Publication_x0020_Date>
+    <Geographic_x0020_Region xmlns="d95a5b16-1b8d-4c7c-9ebf-89c0983b6970"/>
+  </documentManagement>
+</p:properties>
 </file>
 
 <file path=customXml/itemProps1.xml><?xml version="1.0" encoding="utf-8"?>
@@ -28756,12 +29150,9 @@
 </file>
 
 <file path=customXml/itemProps2.xml><?xml version="1.0" encoding="utf-8"?>
-<ds:datastoreItem xmlns:ds="http://schemas.openxmlformats.org/officeDocument/2006/customXml" ds:itemID="{2F4C4F6A-F6A5-45C8-BAAA-52FB70E387C7}">
+<ds:datastoreItem xmlns:ds="http://schemas.openxmlformats.org/officeDocument/2006/customXml" ds:itemID="{B6223829-22B6-4242-8D82-2D6B02106581}">
   <ds:schemaRefs>
-    <ds:schemaRef ds:uri="http://schemas.microsoft.com/office/2006/metadata/properties"/>
-    <ds:schemaRef ds:uri="d95a5b16-1b8d-4c7c-9ebf-89c0983b6970"/>
-    <ds:schemaRef ds:uri="http://schemas.microsoft.com/office/infopath/2007/PartnerControls"/>
-    <ds:schemaRef ds:uri="http://schemas.microsoft.com/sharepoint/v3"/>
+    <ds:schemaRef ds:uri="http://schemas.microsoft.com/sharepoint/events"/>
   </ds:schemaRefs>
 </ds:datastoreItem>
 </file>
@@ -28786,9 +29177,12 @@
 </file>
 
 <file path=customXml/itemProps4.xml><?xml version="1.0" encoding="utf-8"?>
-<ds:datastoreItem xmlns:ds="http://schemas.openxmlformats.org/officeDocument/2006/customXml" ds:itemID="{B6223829-22B6-4242-8D82-2D6B02106581}">
+<ds:datastoreItem xmlns:ds="http://schemas.openxmlformats.org/officeDocument/2006/customXml" ds:itemID="{2F4C4F6A-F6A5-45C8-BAAA-52FB70E387C7}">
   <ds:schemaRefs>
-    <ds:schemaRef ds:uri="http://schemas.microsoft.com/sharepoint/events"/>
+    <ds:schemaRef ds:uri="http://schemas.microsoft.com/office/2006/metadata/properties"/>
+    <ds:schemaRef ds:uri="d95a5b16-1b8d-4c7c-9ebf-89c0983b6970"/>
+    <ds:schemaRef ds:uri="http://schemas.microsoft.com/office/infopath/2007/PartnerControls"/>
+    <ds:schemaRef ds:uri="http://schemas.microsoft.com/sharepoint/v3"/>
   </ds:schemaRefs>
 </ds:datastoreItem>
 </file>
</xml_diff>

<commit_message>
Added Amazon Scraping reference
</commit_message>
<xml_diff>
--- a/ppt/Web Scraping using R.pptx
+++ b/ppt/Web Scraping using R.pptx
@@ -25918,7 +25918,6 @@
               <a:rPr lang="en-CA" sz="2400" dirty="0" smtClean="0"/>
               <a:t>References</a:t>
             </a:r>
-            <a:endParaRPr lang="en-CA" sz="2400" dirty="0" smtClean="0"/>
           </a:p>
           <a:p>
             <a:pPr marL="285750" indent="-285750">
@@ -27121,8 +27120,35 @@
               <a:rPr lang="en-US" dirty="0">
                 <a:cs typeface="Arial" pitchFamily="34" charset="0"/>
               </a:rPr>
-              <a:t>image source — http://bigdatasciencetraining.com/importance-of-learning-r-for-data-science/</a:t>
+              <a:t>image source — http://bigdatasciencetraining.com/importance-of-learning-r-for-data-science</a:t>
             </a:r>
+            <a:r>
+              <a:rPr lang="en-US" dirty="0" smtClean="0">
+                <a:cs typeface="Arial" pitchFamily="34" charset="0"/>
+              </a:rPr>
+              <a:t>/</a:t>
+            </a:r>
+          </a:p>
+          <a:p>
+            <a:pPr marL="285750" indent="-285750">
+              <a:spcBef>
+                <a:spcPts val="0"/>
+              </a:spcBef>
+              <a:spcAft>
+                <a:spcPts val="500"/>
+              </a:spcAft>
+              <a:buFont typeface="Arial" panose="020B0604020202020204" pitchFamily="34" charset="0"/>
+              <a:buChar char="•"/>
+            </a:pPr>
+            <a:r>
+              <a:rPr lang="en-US" dirty="0">
+                <a:cs typeface="Arial" pitchFamily="34" charset="0"/>
+              </a:rPr>
+              <a:t>https://www.freecodecamp.org/news/an-introduction-to-web-scraping-using-r-40284110c848/</a:t>
+            </a:r>
+            <a:endParaRPr lang="en-US" dirty="0">
+              <a:cs typeface="Arial" pitchFamily="34" charset="0"/>
+            </a:endParaRPr>
           </a:p>
           <a:p>
             <a:pPr>
@@ -28477,139 +28503,84 @@
 </file>
 
 <file path=customXml/item2.xml><?xml version="1.0" encoding="utf-8"?>
-<?mso-contentType ?>
-<spe:Receivers xmlns:spe="http://schemas.microsoft.com/sharepoint/events">
-  <Receiver>
-    <Name>ItemUpdatedEventHandlerForConceptSearch</Name>
-    <Synchronization>Default</Synchronization>
-    <Type>10002</Type>
-    <SequenceNumber>10001</SequenceNumber>
-    <Assembly>conceptSearching.Sharepoint.ContentTypes, Version=1.0.0.0, Culture=neutral, PublicKeyToken=858f8f13980e4745</Assembly>
-    <Class>conceptSearching.Sharepoint.ContentTypes.CSHandleEvent</Class>
-    <Data/>
-    <Filter/>
-  </Receiver>
-  <Receiver>
-    <Name>ItemCheckedInEventHandlerForConceptSearch</Name>
-    <Synchronization>Default</Synchronization>
-    <Type>10004</Type>
-    <SequenceNumber>10002</SequenceNumber>
-    <Assembly>conceptSearching.Sharepoint.ContentTypes, Version=1.0.0.0, Culture=neutral, PublicKeyToken=858f8f13980e4745</Assembly>
-    <Class>conceptSearching.Sharepoint.ContentTypes.CSHandleEvent</Class>
-    <Data/>
-    <Filter/>
-  </Receiver>
-  <Receiver>
-    <Name>ItemUncheckedOutEventHandlerForConceptSearch</Name>
-    <Synchronization>Default</Synchronization>
-    <Type>10006</Type>
-    <SequenceNumber>10003</SequenceNumber>
-    <Assembly>conceptSearching.Sharepoint.ContentTypes, Version=1.0.0.0, Culture=neutral, PublicKeyToken=858f8f13980e4745</Assembly>
-    <Class>conceptSearching.Sharepoint.ContentTypes.CSHandleEvent</Class>
-    <Data/>
-    <Filter/>
-  </Receiver>
-  <Receiver>
-    <Name>ItemAddedEventHandlerForConceptSearch</Name>
-    <Synchronization>Default</Synchronization>
-    <Type>10001</Type>
-    <SequenceNumber>10004</SequenceNumber>
-    <Assembly>conceptSearching.Sharepoint.ContentTypes, Version=1.0.0.0, Culture=neutral, PublicKeyToken=858f8f13980e4745</Assembly>
-    <Class>conceptSearching.Sharepoint.ContentTypes.CSHandleEvent</Class>
-    <Data/>
-    <Filter/>
-  </Receiver>
-  <Receiver>
-    <Name>ItemFileMovedEventHandlerForConceptSearch</Name>
-    <Synchronization>Default</Synchronization>
-    <Type>10009</Type>
-    <SequenceNumber>10005</SequenceNumber>
-    <Assembly>conceptSearching.Sharepoint.ContentTypes, Version=1.0.0.0, Culture=neutral, PublicKeyToken=858f8f13980e4745</Assembly>
-    <Class>conceptSearching.Sharepoint.ContentTypes.CSHandleEvent</Class>
-    <Data/>
-    <Filter/>
-  </Receiver>
-  <Receiver>
-    <Name>ItemDeletedEventHandlerForConceptSearch</Name>
-    <Synchronization>Default</Synchronization>
-    <Type>10003</Type>
-    <SequenceNumber>10006</SequenceNumber>
-    <Assembly>conceptSearching.Sharepoint.ContentTypes, Version=1.0.0.0, Culture=neutral, PublicKeyToken=858f8f13980e4745</Assembly>
-    <Class>conceptSearching.Sharepoint.ContentTypes.CSHandleEvent</Class>
-    <Data/>
-    <Filter/>
-  </Receiver>
-  <Receiver>
-    <Name>ItemUpdatedEventHandlerForConceptSearch</Name>
-    <Synchronization>Asynchronous</Synchronization>
-    <Type>10002</Type>
-    <SequenceNumber>10001</SequenceNumber>
-    <Assembly>conceptSearching.Sharepoint.ContentTypes2010, Version=1.0.0.0, Culture=neutral, PublicKeyToken=858f8f13980e4745</Assembly>
-    <Class>conceptSearching.Sharepoint.ContentTypes2010.CSHandleEvent</Class>
-    <Data/>
-    <Filter/>
-  </Receiver>
-  <Receiver>
-    <Name>ItemUpdatingEventHandlerForConceptSearch</Name>
-    <Synchronization>Synchronous</Synchronization>
-    <Type>2</Type>
-    <SequenceNumber>10001</SequenceNumber>
-    <Assembly>conceptSearching.Sharepoint.ContentTypes2010, Version=1.0.0.0, Culture=neutral, PublicKeyToken=858f8f13980e4745</Assembly>
-    <Class>conceptSearching.Sharepoint.ContentTypes2010.CSHandleEvent</Class>
-    <Data/>
-    <Filter/>
-  </Receiver>
-  <Receiver>
-    <Name>ItemCheckedInEventHandlerForConceptSearch</Name>
-    <Synchronization>Asynchronous</Synchronization>
-    <Type>10004</Type>
-    <SequenceNumber>10002</SequenceNumber>
-    <Assembly>conceptSearching.Sharepoint.ContentTypes2010, Version=1.0.0.0, Culture=neutral, PublicKeyToken=858f8f13980e4745</Assembly>
-    <Class>conceptSearching.Sharepoint.ContentTypes2010.CSHandleEvent</Class>
-    <Data/>
-    <Filter/>
-  </Receiver>
-  <Receiver>
-    <Name>ItemUncheckedOutEventHandlerForConceptSearch</Name>
-    <Synchronization>Asynchronous</Synchronization>
-    <Type>10006</Type>
-    <SequenceNumber>10003</SequenceNumber>
-    <Assembly>conceptSearching.Sharepoint.ContentTypes2010, Version=1.0.0.0, Culture=neutral, PublicKeyToken=858f8f13980e4745</Assembly>
-    <Class>conceptSearching.Sharepoint.ContentTypes2010.CSHandleEvent</Class>
-    <Data/>
-    <Filter/>
-  </Receiver>
-  <Receiver>
-    <Name>ItemAddedEventHandlerForConceptSearch</Name>
-    <Synchronization>Asynchronous</Synchronization>
-    <Type>10001</Type>
-    <SequenceNumber>10004</SequenceNumber>
-    <Assembly>conceptSearching.Sharepoint.ContentTypes2010, Version=1.0.0.0, Culture=neutral, PublicKeyToken=858f8f13980e4745</Assembly>
-    <Class>conceptSearching.Sharepoint.ContentTypes2010.CSHandleEvent</Class>
-    <Data/>
-    <Filter/>
-  </Receiver>
-  <Receiver>
-    <Name>ItemFileMovedEventHandlerForConceptSearch</Name>
-    <Synchronization>Asynchronous</Synchronization>
-    <Type>10009</Type>
-    <SequenceNumber>10005</SequenceNumber>
-    <Assembly>conceptSearching.Sharepoint.ContentTypes2010, Version=1.0.0.0, Culture=neutral, PublicKeyToken=858f8f13980e4745</Assembly>
-    <Class>conceptSearching.Sharepoint.ContentTypes2010.CSHandleEvent</Class>
-    <Data/>
-    <Filter/>
-  </Receiver>
-  <Receiver>
-    <Name>ItemDeletedEventHandlerForConceptSearch</Name>
-    <Synchronization>Asynchronous</Synchronization>
-    <Type>10003</Type>
-    <SequenceNumber>10006</SequenceNumber>
-    <Assembly>conceptSearching.Sharepoint.ContentTypes2010, Version=1.0.0.0, Culture=neutral, PublicKeyToken=858f8f13980e4745</Assembly>
-    <Class>conceptSearching.Sharepoint.ContentTypes2010.CSHandleEvent</Class>
-    <Data/>
-    <Filter/>
-  </Receiver>
-</spe:Receivers>
+<p:properties xmlns:p="http://schemas.microsoft.com/office/2006/metadata/properties" xmlns:xsi="http://www.w3.org/2001/XMLSchema-instance">
+  <documentManagement>
+    <c5aebc35b3e840e5912c276ffe755dcf xmlns="d95a5b16-1b8d-4c7c-9ebf-89c0983b6970">
+      <Terms xmlns="http://schemas.microsoft.com/office/infopath/2007/PartnerControls"/>
+    </c5aebc35b3e840e5912c276ffe755dcf>
+    <c79d12643ffc4d60ab657aaa1718cc32 xmlns="d95a5b16-1b8d-4c7c-9ebf-89c0983b6970">
+      <Terms xmlns="http://schemas.microsoft.com/office/infopath/2007/PartnerControls">
+        <TermInfo xmlns="http://schemas.microsoft.com/office/infopath/2007/PartnerControls">
+          <TermName xmlns="http://schemas.microsoft.com/office/infopath/2007/PartnerControls">Corporate</TermName>
+          <TermId xmlns="http://schemas.microsoft.com/office/infopath/2007/PartnerControls">43ac7042-3752-4f1b-8a93-43b36e65d3e5</TermId>
+        </TermInfo>
+      </Terms>
+    </c79d12643ffc4d60ab657aaa1718cc32>
+    <p43f7bb208e443c9b50eb304fe6606a3 xmlns="d95a5b16-1b8d-4c7c-9ebf-89c0983b6970">
+      <Terms xmlns="http://schemas.microsoft.com/office/infopath/2007/PartnerControls"/>
+    </p43f7bb208e443c9b50eb304fe6606a3>
+    <TaxCatchAll xmlns="d95a5b16-1b8d-4c7c-9ebf-89c0983b6970">
+      <Value>260</Value>
+      <Value>46118</Value>
+      <Value>3697</Value>
+      <Value>46486</Value>
+    </TaxCatchAll>
+    <eafb632c3f5c40ba98242be6bbd6bb17 xmlns="d95a5b16-1b8d-4c7c-9ebf-89c0983b6970">
+      <Terms xmlns="http://schemas.microsoft.com/office/infopath/2007/PartnerControls"/>
+    </eafb632c3f5c40ba98242be6bbd6bb17>
+    <b0f7c43cb32a4bb99696cc0157e407bc xmlns="d95a5b16-1b8d-4c7c-9ebf-89c0983b6970">
+      <Terms xmlns="http://schemas.microsoft.com/office/infopath/2007/PartnerControls"/>
+    </b0f7c43cb32a4bb99696cc0157e407bc>
+    <gd9a5f5f69a84d75ad992b5cd341c76b xmlns="d95a5b16-1b8d-4c7c-9ebf-89c0983b6970">
+      <Terms xmlns="http://schemas.microsoft.com/office/infopath/2007/PartnerControls"/>
+    </gd9a5f5f69a84d75ad992b5cd341c76b>
+    <o5847c86b23d428c853490e0a9abf024 xmlns="d95a5b16-1b8d-4c7c-9ebf-89c0983b6970">
+      <Terms xmlns="http://schemas.microsoft.com/office/infopath/2007/PartnerControls"/>
+    </o5847c86b23d428c853490e0a9abf024>
+    <kbc8ce58d0914d5e9641963f23cd2adf xmlns="d95a5b16-1b8d-4c7c-9ebf-89c0983b6970">
+      <Terms xmlns="http://schemas.microsoft.com/office/infopath/2007/PartnerControls">
+        <TermInfo xmlns="http://schemas.microsoft.com/office/infopath/2007/PartnerControls">
+          <TermName xmlns="http://schemas.microsoft.com/office/infopath/2007/PartnerControls">Communications ＆ Investor Relations</TermName>
+          <TermId xmlns="http://schemas.microsoft.com/office/infopath/2007/PartnerControls">fb65bde5-f439-4af8-aaa0-dcf1364d6414</TermId>
+        </TermInfo>
+      </Terms>
+    </kbc8ce58d0914d5e9641963f23cd2adf>
+    <ae4bb7bb5e1849a3a75b9d2ac781ba53 xmlns="d95a5b16-1b8d-4c7c-9ebf-89c0983b6970">
+      <Terms xmlns="http://schemas.microsoft.com/office/infopath/2007/PartnerControls">
+        <TermInfo xmlns="http://schemas.microsoft.com/office/infopath/2007/PartnerControls">
+          <TermName xmlns="http://schemas.microsoft.com/office/infopath/2007/PartnerControls">Brand template</TermName>
+          <TermId xmlns="http://schemas.microsoft.com/office/infopath/2007/PartnerControls">a8dae13e-44bb-4ec1-860e-cc2305177641</TermId>
+        </TermInfo>
+      </Terms>
+    </ae4bb7bb5e1849a3a75b9d2ac781ba53>
+    <Creator xmlns="d95a5b16-1b8d-4c7c-9ebf-89c0983b6970" xsi:nil="true"/>
+    <Language xmlns="http://schemas.microsoft.com/sharepoint/v3">EN</Language>
+    <CSMeta2010Field xmlns="http://schemas.microsoft.com/sharepoint/v3">cf78e423-0039-41cd-b5ec-35c354449ae3;2019-08-12 17:17:32;PARTIALMANUALCLASSIFIED;Topic:2019-08-12 17:17:32|False||AUTOCLASSIFIED|2019-08-12 17:17:32|UNDEFINED|00000000-0000-0000-0000-000000000000;Organization:2018-06-14 16:30:37|False|2018-06-14 16:34:19|MANUALCLASSIFIED|2018-06-14 16:34:19|UNDEFINED|00000000-0000-0000-0000-000000000000;Industry:2019-08-12 17:17:32|False||AUTOCLASSIFIED|2019-08-12 17:17:32|UNDEFINED|00000000-0000-0000-0000-000000000000;Service line:2019-08-12 17:17:32|False||AUTOCLASSIFIED|2019-08-12 17:17:32|UNDEFINED|00000000-0000-0000-0000-000000000000;Business Practice:2019-08-12 17:17:32|False||AUTOCLASSIFIED|2019-08-12 17:17:32|UNDEFINED|00000000-0000-0000-0000-000000000000;Intellectual Property:2019-08-12 17:17:32|False||AUTOCLASSIFIED|2019-08-12 17:17:32|UNDEFINED|00000000-0000-0000-0000-000000000000;Content Format:2018-06-14 16:30:37|False|2018-06-14 16:34:19|MANUALCLASSIFIED|2018-06-14 16:34:19|UNDEFINED|00000000-0000-0000-0000-000000000000;Functions:2019-08-12 17:17:32|False||AUTOCLASSIFIED|2019-08-12 17:17:32|UNDEFINED|00000000-0000-0000-0000-000000000000;Geography:2019-08-12 17:17:32|False||AUTOCLASSIFIED|2019-08-12 17:17:32|UNDEFINED|00000000-0000-0000-0000-000000000000;False</CSMeta2010Field>
+    <Abstract xmlns="d95a5b16-1b8d-4c7c-9ebf-89c0983b6970">CGI widescreen graphic PowerPoint template - English version</Abstract>
+    <External_x0020_Use xmlns="d95a5b16-1b8d-4c7c-9ebf-89c0983b6970">No</External_x0020_Use>
+    <Owner_x0020_Organisation xmlns="d95a5b16-1b8d-4c7c-9ebf-89c0983b6970">Group</Owner_x0020_Organisation>
+    <BS_x0020_Document_x0020_Sub_x0020_Type xmlns="d95a5b16-1b8d-4c7c-9ebf-89c0983b6970">Business Aid</BS_x0020_Document_x0020_Sub_x0020_Type>
+    <Market xmlns="d95a5b16-1b8d-4c7c-9ebf-89c0983b6970"/>
+    <TaxKeywordTaxHTField xmlns="d95a5b16-1b8d-4c7c-9ebf-89c0983b6970">
+      <Terms xmlns="http://schemas.microsoft.com/office/infopath/2007/PartnerControls">
+        <TermInfo xmlns="http://schemas.microsoft.com/office/infopath/2007/PartnerControls">
+          <TermName xmlns="http://schemas.microsoft.com/office/infopath/2007/PartnerControls">PowerPoint</TermName>
+          <TermId xmlns="http://schemas.microsoft.com/office/infopath/2007/PartnerControls">5b4ca844-900d-4151-9c88-1a4b47550bee</TermId>
+        </TermInfo>
+      </Terms>
+    </TaxKeywordTaxHTField>
+    <Best_x0020_Before_x0020_Date xmlns="d95a5b16-1b8d-4c7c-9ebf-89c0983b6970">2023-06-13T23:00:00+00:00</Best_x0020_Before_x0020_Date>
+    <Published_x0020_By xmlns="d95a5b16-1b8d-4c7c-9ebf-89c0983b6970">
+      <UserInfo>
+        <DisplayName>Stiller, Regina C</DisplayName>
+        <AccountId>55167</AccountId>
+        <AccountType/>
+      </UserInfo>
+    </Published_x0020_By>
+    <Publication_x0020_Date xmlns="d95a5b16-1b8d-4c7c-9ebf-89c0983b6970">2018-06-13T23:00:00+00:00</Publication_x0020_Date>
+    <Geographic_x0020_Region xmlns="d95a5b16-1b8d-4c7c-9ebf-89c0983b6970"/>
+  </documentManagement>
+</p:properties>
 </file>
 
 <file path=customXml/item3.xml><?xml version="1.0" encoding="utf-8"?>
@@ -29061,84 +29032,139 @@
 </file>
 
 <file path=customXml/item4.xml><?xml version="1.0" encoding="utf-8"?>
-<p:properties xmlns:p="http://schemas.microsoft.com/office/2006/metadata/properties" xmlns:xsi="http://www.w3.org/2001/XMLSchema-instance">
-  <documentManagement>
-    <c5aebc35b3e840e5912c276ffe755dcf xmlns="d95a5b16-1b8d-4c7c-9ebf-89c0983b6970">
-      <Terms xmlns="http://schemas.microsoft.com/office/infopath/2007/PartnerControls"/>
-    </c5aebc35b3e840e5912c276ffe755dcf>
-    <c79d12643ffc4d60ab657aaa1718cc32 xmlns="d95a5b16-1b8d-4c7c-9ebf-89c0983b6970">
-      <Terms xmlns="http://schemas.microsoft.com/office/infopath/2007/PartnerControls">
-        <TermInfo xmlns="http://schemas.microsoft.com/office/infopath/2007/PartnerControls">
-          <TermName xmlns="http://schemas.microsoft.com/office/infopath/2007/PartnerControls">Corporate</TermName>
-          <TermId xmlns="http://schemas.microsoft.com/office/infopath/2007/PartnerControls">43ac7042-3752-4f1b-8a93-43b36e65d3e5</TermId>
-        </TermInfo>
-      </Terms>
-    </c79d12643ffc4d60ab657aaa1718cc32>
-    <p43f7bb208e443c9b50eb304fe6606a3 xmlns="d95a5b16-1b8d-4c7c-9ebf-89c0983b6970">
-      <Terms xmlns="http://schemas.microsoft.com/office/infopath/2007/PartnerControls"/>
-    </p43f7bb208e443c9b50eb304fe6606a3>
-    <TaxCatchAll xmlns="d95a5b16-1b8d-4c7c-9ebf-89c0983b6970">
-      <Value>260</Value>
-      <Value>46118</Value>
-      <Value>3697</Value>
-      <Value>46486</Value>
-    </TaxCatchAll>
-    <eafb632c3f5c40ba98242be6bbd6bb17 xmlns="d95a5b16-1b8d-4c7c-9ebf-89c0983b6970">
-      <Terms xmlns="http://schemas.microsoft.com/office/infopath/2007/PartnerControls"/>
-    </eafb632c3f5c40ba98242be6bbd6bb17>
-    <b0f7c43cb32a4bb99696cc0157e407bc xmlns="d95a5b16-1b8d-4c7c-9ebf-89c0983b6970">
-      <Terms xmlns="http://schemas.microsoft.com/office/infopath/2007/PartnerControls"/>
-    </b0f7c43cb32a4bb99696cc0157e407bc>
-    <gd9a5f5f69a84d75ad992b5cd341c76b xmlns="d95a5b16-1b8d-4c7c-9ebf-89c0983b6970">
-      <Terms xmlns="http://schemas.microsoft.com/office/infopath/2007/PartnerControls"/>
-    </gd9a5f5f69a84d75ad992b5cd341c76b>
-    <o5847c86b23d428c853490e0a9abf024 xmlns="d95a5b16-1b8d-4c7c-9ebf-89c0983b6970">
-      <Terms xmlns="http://schemas.microsoft.com/office/infopath/2007/PartnerControls"/>
-    </o5847c86b23d428c853490e0a9abf024>
-    <kbc8ce58d0914d5e9641963f23cd2adf xmlns="d95a5b16-1b8d-4c7c-9ebf-89c0983b6970">
-      <Terms xmlns="http://schemas.microsoft.com/office/infopath/2007/PartnerControls">
-        <TermInfo xmlns="http://schemas.microsoft.com/office/infopath/2007/PartnerControls">
-          <TermName xmlns="http://schemas.microsoft.com/office/infopath/2007/PartnerControls">Communications ＆ Investor Relations</TermName>
-          <TermId xmlns="http://schemas.microsoft.com/office/infopath/2007/PartnerControls">fb65bde5-f439-4af8-aaa0-dcf1364d6414</TermId>
-        </TermInfo>
-      </Terms>
-    </kbc8ce58d0914d5e9641963f23cd2adf>
-    <ae4bb7bb5e1849a3a75b9d2ac781ba53 xmlns="d95a5b16-1b8d-4c7c-9ebf-89c0983b6970">
-      <Terms xmlns="http://schemas.microsoft.com/office/infopath/2007/PartnerControls">
-        <TermInfo xmlns="http://schemas.microsoft.com/office/infopath/2007/PartnerControls">
-          <TermName xmlns="http://schemas.microsoft.com/office/infopath/2007/PartnerControls">Brand template</TermName>
-          <TermId xmlns="http://schemas.microsoft.com/office/infopath/2007/PartnerControls">a8dae13e-44bb-4ec1-860e-cc2305177641</TermId>
-        </TermInfo>
-      </Terms>
-    </ae4bb7bb5e1849a3a75b9d2ac781ba53>
-    <Creator xmlns="d95a5b16-1b8d-4c7c-9ebf-89c0983b6970" xsi:nil="true"/>
-    <Language xmlns="http://schemas.microsoft.com/sharepoint/v3">EN</Language>
-    <CSMeta2010Field xmlns="http://schemas.microsoft.com/sharepoint/v3">cf78e423-0039-41cd-b5ec-35c354449ae3;2019-08-12 17:17:32;PARTIALMANUALCLASSIFIED;Topic:2019-08-12 17:17:32|False||AUTOCLASSIFIED|2019-08-12 17:17:32|UNDEFINED|00000000-0000-0000-0000-000000000000;Organization:2018-06-14 16:30:37|False|2018-06-14 16:34:19|MANUALCLASSIFIED|2018-06-14 16:34:19|UNDEFINED|00000000-0000-0000-0000-000000000000;Industry:2019-08-12 17:17:32|False||AUTOCLASSIFIED|2019-08-12 17:17:32|UNDEFINED|00000000-0000-0000-0000-000000000000;Service line:2019-08-12 17:17:32|False||AUTOCLASSIFIED|2019-08-12 17:17:32|UNDEFINED|00000000-0000-0000-0000-000000000000;Business Practice:2019-08-12 17:17:32|False||AUTOCLASSIFIED|2019-08-12 17:17:32|UNDEFINED|00000000-0000-0000-0000-000000000000;Intellectual Property:2019-08-12 17:17:32|False||AUTOCLASSIFIED|2019-08-12 17:17:32|UNDEFINED|00000000-0000-0000-0000-000000000000;Content Format:2018-06-14 16:30:37|False|2018-06-14 16:34:19|MANUALCLASSIFIED|2018-06-14 16:34:19|UNDEFINED|00000000-0000-0000-0000-000000000000;Functions:2019-08-12 17:17:32|False||AUTOCLASSIFIED|2019-08-12 17:17:32|UNDEFINED|00000000-0000-0000-0000-000000000000;Geography:2019-08-12 17:17:32|False||AUTOCLASSIFIED|2019-08-12 17:17:32|UNDEFINED|00000000-0000-0000-0000-000000000000;False</CSMeta2010Field>
-    <Abstract xmlns="d95a5b16-1b8d-4c7c-9ebf-89c0983b6970">CGI widescreen graphic PowerPoint template - English version</Abstract>
-    <External_x0020_Use xmlns="d95a5b16-1b8d-4c7c-9ebf-89c0983b6970">No</External_x0020_Use>
-    <Owner_x0020_Organisation xmlns="d95a5b16-1b8d-4c7c-9ebf-89c0983b6970">Group</Owner_x0020_Organisation>
-    <BS_x0020_Document_x0020_Sub_x0020_Type xmlns="d95a5b16-1b8d-4c7c-9ebf-89c0983b6970">Business Aid</BS_x0020_Document_x0020_Sub_x0020_Type>
-    <Market xmlns="d95a5b16-1b8d-4c7c-9ebf-89c0983b6970"/>
-    <TaxKeywordTaxHTField xmlns="d95a5b16-1b8d-4c7c-9ebf-89c0983b6970">
-      <Terms xmlns="http://schemas.microsoft.com/office/infopath/2007/PartnerControls">
-        <TermInfo xmlns="http://schemas.microsoft.com/office/infopath/2007/PartnerControls">
-          <TermName xmlns="http://schemas.microsoft.com/office/infopath/2007/PartnerControls">PowerPoint</TermName>
-          <TermId xmlns="http://schemas.microsoft.com/office/infopath/2007/PartnerControls">5b4ca844-900d-4151-9c88-1a4b47550bee</TermId>
-        </TermInfo>
-      </Terms>
-    </TaxKeywordTaxHTField>
-    <Best_x0020_Before_x0020_Date xmlns="d95a5b16-1b8d-4c7c-9ebf-89c0983b6970">2023-06-13T23:00:00+00:00</Best_x0020_Before_x0020_Date>
-    <Published_x0020_By xmlns="d95a5b16-1b8d-4c7c-9ebf-89c0983b6970">
-      <UserInfo>
-        <DisplayName>Stiller, Regina C</DisplayName>
-        <AccountId>55167</AccountId>
-        <AccountType/>
-      </UserInfo>
-    </Published_x0020_By>
-    <Publication_x0020_Date xmlns="d95a5b16-1b8d-4c7c-9ebf-89c0983b6970">2018-06-13T23:00:00+00:00</Publication_x0020_Date>
-    <Geographic_x0020_Region xmlns="d95a5b16-1b8d-4c7c-9ebf-89c0983b6970"/>
-  </documentManagement>
-</p:properties>
+<?mso-contentType ?>
+<spe:Receivers xmlns:spe="http://schemas.microsoft.com/sharepoint/events">
+  <Receiver>
+    <Name>ItemUpdatedEventHandlerForConceptSearch</Name>
+    <Synchronization>Default</Synchronization>
+    <Type>10002</Type>
+    <SequenceNumber>10001</SequenceNumber>
+    <Assembly>conceptSearching.Sharepoint.ContentTypes, Version=1.0.0.0, Culture=neutral, PublicKeyToken=858f8f13980e4745</Assembly>
+    <Class>conceptSearching.Sharepoint.ContentTypes.CSHandleEvent</Class>
+    <Data/>
+    <Filter/>
+  </Receiver>
+  <Receiver>
+    <Name>ItemCheckedInEventHandlerForConceptSearch</Name>
+    <Synchronization>Default</Synchronization>
+    <Type>10004</Type>
+    <SequenceNumber>10002</SequenceNumber>
+    <Assembly>conceptSearching.Sharepoint.ContentTypes, Version=1.0.0.0, Culture=neutral, PublicKeyToken=858f8f13980e4745</Assembly>
+    <Class>conceptSearching.Sharepoint.ContentTypes.CSHandleEvent</Class>
+    <Data/>
+    <Filter/>
+  </Receiver>
+  <Receiver>
+    <Name>ItemUncheckedOutEventHandlerForConceptSearch</Name>
+    <Synchronization>Default</Synchronization>
+    <Type>10006</Type>
+    <SequenceNumber>10003</SequenceNumber>
+    <Assembly>conceptSearching.Sharepoint.ContentTypes, Version=1.0.0.0, Culture=neutral, PublicKeyToken=858f8f13980e4745</Assembly>
+    <Class>conceptSearching.Sharepoint.ContentTypes.CSHandleEvent</Class>
+    <Data/>
+    <Filter/>
+  </Receiver>
+  <Receiver>
+    <Name>ItemAddedEventHandlerForConceptSearch</Name>
+    <Synchronization>Default</Synchronization>
+    <Type>10001</Type>
+    <SequenceNumber>10004</SequenceNumber>
+    <Assembly>conceptSearching.Sharepoint.ContentTypes, Version=1.0.0.0, Culture=neutral, PublicKeyToken=858f8f13980e4745</Assembly>
+    <Class>conceptSearching.Sharepoint.ContentTypes.CSHandleEvent</Class>
+    <Data/>
+    <Filter/>
+  </Receiver>
+  <Receiver>
+    <Name>ItemFileMovedEventHandlerForConceptSearch</Name>
+    <Synchronization>Default</Synchronization>
+    <Type>10009</Type>
+    <SequenceNumber>10005</SequenceNumber>
+    <Assembly>conceptSearching.Sharepoint.ContentTypes, Version=1.0.0.0, Culture=neutral, PublicKeyToken=858f8f13980e4745</Assembly>
+    <Class>conceptSearching.Sharepoint.ContentTypes.CSHandleEvent</Class>
+    <Data/>
+    <Filter/>
+  </Receiver>
+  <Receiver>
+    <Name>ItemDeletedEventHandlerForConceptSearch</Name>
+    <Synchronization>Default</Synchronization>
+    <Type>10003</Type>
+    <SequenceNumber>10006</SequenceNumber>
+    <Assembly>conceptSearching.Sharepoint.ContentTypes, Version=1.0.0.0, Culture=neutral, PublicKeyToken=858f8f13980e4745</Assembly>
+    <Class>conceptSearching.Sharepoint.ContentTypes.CSHandleEvent</Class>
+    <Data/>
+    <Filter/>
+  </Receiver>
+  <Receiver>
+    <Name>ItemUpdatedEventHandlerForConceptSearch</Name>
+    <Synchronization>Asynchronous</Synchronization>
+    <Type>10002</Type>
+    <SequenceNumber>10001</SequenceNumber>
+    <Assembly>conceptSearching.Sharepoint.ContentTypes2010, Version=1.0.0.0, Culture=neutral, PublicKeyToken=858f8f13980e4745</Assembly>
+    <Class>conceptSearching.Sharepoint.ContentTypes2010.CSHandleEvent</Class>
+    <Data/>
+    <Filter/>
+  </Receiver>
+  <Receiver>
+    <Name>ItemUpdatingEventHandlerForConceptSearch</Name>
+    <Synchronization>Synchronous</Synchronization>
+    <Type>2</Type>
+    <SequenceNumber>10001</SequenceNumber>
+    <Assembly>conceptSearching.Sharepoint.ContentTypes2010, Version=1.0.0.0, Culture=neutral, PublicKeyToken=858f8f13980e4745</Assembly>
+    <Class>conceptSearching.Sharepoint.ContentTypes2010.CSHandleEvent</Class>
+    <Data/>
+    <Filter/>
+  </Receiver>
+  <Receiver>
+    <Name>ItemCheckedInEventHandlerForConceptSearch</Name>
+    <Synchronization>Asynchronous</Synchronization>
+    <Type>10004</Type>
+    <SequenceNumber>10002</SequenceNumber>
+    <Assembly>conceptSearching.Sharepoint.ContentTypes2010, Version=1.0.0.0, Culture=neutral, PublicKeyToken=858f8f13980e4745</Assembly>
+    <Class>conceptSearching.Sharepoint.ContentTypes2010.CSHandleEvent</Class>
+    <Data/>
+    <Filter/>
+  </Receiver>
+  <Receiver>
+    <Name>ItemUncheckedOutEventHandlerForConceptSearch</Name>
+    <Synchronization>Asynchronous</Synchronization>
+    <Type>10006</Type>
+    <SequenceNumber>10003</SequenceNumber>
+    <Assembly>conceptSearching.Sharepoint.ContentTypes2010, Version=1.0.0.0, Culture=neutral, PublicKeyToken=858f8f13980e4745</Assembly>
+    <Class>conceptSearching.Sharepoint.ContentTypes2010.CSHandleEvent</Class>
+    <Data/>
+    <Filter/>
+  </Receiver>
+  <Receiver>
+    <Name>ItemAddedEventHandlerForConceptSearch</Name>
+    <Synchronization>Asynchronous</Synchronization>
+    <Type>10001</Type>
+    <SequenceNumber>10004</SequenceNumber>
+    <Assembly>conceptSearching.Sharepoint.ContentTypes2010, Version=1.0.0.0, Culture=neutral, PublicKeyToken=858f8f13980e4745</Assembly>
+    <Class>conceptSearching.Sharepoint.ContentTypes2010.CSHandleEvent</Class>
+    <Data/>
+    <Filter/>
+  </Receiver>
+  <Receiver>
+    <Name>ItemFileMovedEventHandlerForConceptSearch</Name>
+    <Synchronization>Asynchronous</Synchronization>
+    <Type>10009</Type>
+    <SequenceNumber>10005</SequenceNumber>
+    <Assembly>conceptSearching.Sharepoint.ContentTypes2010, Version=1.0.0.0, Culture=neutral, PublicKeyToken=858f8f13980e4745</Assembly>
+    <Class>conceptSearching.Sharepoint.ContentTypes2010.CSHandleEvent</Class>
+    <Data/>
+    <Filter/>
+  </Receiver>
+  <Receiver>
+    <Name>ItemDeletedEventHandlerForConceptSearch</Name>
+    <Synchronization>Asynchronous</Synchronization>
+    <Type>10003</Type>
+    <SequenceNumber>10006</SequenceNumber>
+    <Assembly>conceptSearching.Sharepoint.ContentTypes2010, Version=1.0.0.0, Culture=neutral, PublicKeyToken=858f8f13980e4745</Assembly>
+    <Class>conceptSearching.Sharepoint.ContentTypes2010.CSHandleEvent</Class>
+    <Data/>
+    <Filter/>
+  </Receiver>
+</spe:Receivers>
 </file>
 
 <file path=customXml/itemProps1.xml><?xml version="1.0" encoding="utf-8"?>
@@ -29150,9 +29176,12 @@
 </file>
 
 <file path=customXml/itemProps2.xml><?xml version="1.0" encoding="utf-8"?>
-<ds:datastoreItem xmlns:ds="http://schemas.openxmlformats.org/officeDocument/2006/customXml" ds:itemID="{B6223829-22B6-4242-8D82-2D6B02106581}">
+<ds:datastoreItem xmlns:ds="http://schemas.openxmlformats.org/officeDocument/2006/customXml" ds:itemID="{2F4C4F6A-F6A5-45C8-BAAA-52FB70E387C7}">
   <ds:schemaRefs>
-    <ds:schemaRef ds:uri="http://schemas.microsoft.com/sharepoint/events"/>
+    <ds:schemaRef ds:uri="http://schemas.microsoft.com/office/2006/metadata/properties"/>
+    <ds:schemaRef ds:uri="d95a5b16-1b8d-4c7c-9ebf-89c0983b6970"/>
+    <ds:schemaRef ds:uri="http://schemas.microsoft.com/office/infopath/2007/PartnerControls"/>
+    <ds:schemaRef ds:uri="http://schemas.microsoft.com/sharepoint/v3"/>
   </ds:schemaRefs>
 </ds:datastoreItem>
 </file>
@@ -29177,12 +29206,9 @@
 </file>
 
 <file path=customXml/itemProps4.xml><?xml version="1.0" encoding="utf-8"?>
-<ds:datastoreItem xmlns:ds="http://schemas.openxmlformats.org/officeDocument/2006/customXml" ds:itemID="{2F4C4F6A-F6A5-45C8-BAAA-52FB70E387C7}">
+<ds:datastoreItem xmlns:ds="http://schemas.openxmlformats.org/officeDocument/2006/customXml" ds:itemID="{B6223829-22B6-4242-8D82-2D6B02106581}">
   <ds:schemaRefs>
-    <ds:schemaRef ds:uri="http://schemas.microsoft.com/office/2006/metadata/properties"/>
-    <ds:schemaRef ds:uri="d95a5b16-1b8d-4c7c-9ebf-89c0983b6970"/>
-    <ds:schemaRef ds:uri="http://schemas.microsoft.com/office/infopath/2007/PartnerControls"/>
-    <ds:schemaRef ds:uri="http://schemas.microsoft.com/sharepoint/v3"/>
+    <ds:schemaRef ds:uri="http://schemas.microsoft.com/sharepoint/events"/>
   </ds:schemaRefs>
 </ds:datastoreItem>
 </file>
</xml_diff>

<commit_message>
Updated the reference slide
</commit_message>
<xml_diff>
--- a/ppt/Web Scraping using R.pptx
+++ b/ppt/Web Scraping using R.pptx
@@ -18,9 +18,9 @@
     <p:sldId id="282" r:id="rId10"/>
     <p:sldId id="401" r:id="rId11"/>
     <p:sldId id="402" r:id="rId12"/>
-    <p:sldId id="391" r:id="rId13"/>
-    <p:sldId id="395" r:id="rId14"/>
-    <p:sldId id="378" r:id="rId15"/>
+    <p:sldId id="395" r:id="rId13"/>
+    <p:sldId id="378" r:id="rId14"/>
+    <p:sldId id="391" r:id="rId15"/>
   </p:sldIdLst>
   <p:sldSz cx="12192000" cy="6858000"/>
   <p:notesSz cx="6858000" cy="9144000"/>
@@ -882,7 +882,7 @@
     </p:spTree>
     <p:extLst>
       <p:ext uri="{BB962C8B-B14F-4D97-AF65-F5344CB8AC3E}">
-        <p14:creationId xmlns:p14="http://schemas.microsoft.com/office/powerpoint/2010/main" val="669895288"/>
+        <p14:creationId xmlns:p14="http://schemas.microsoft.com/office/powerpoint/2010/main" val="3122527666"/>
       </p:ext>
     </p:extLst>
   </p:cSld>
@@ -1476,12 +1476,7 @@
             <p:ph type="sldImg"/>
           </p:nvPr>
         </p:nvSpPr>
-        <p:spPr>
-          <a:xfrm>
-            <a:off x="381000" y="685800"/>
-            <a:ext cx="6096000" cy="3429000"/>
-          </a:xfrm>
-        </p:spPr>
+        <p:spPr/>
       </p:sp>
       <p:sp>
         <p:nvSpPr>
@@ -1495,9 +1490,7 @@
         </p:nvSpPr>
         <p:spPr/>
         <p:txBody>
-          <a:bodyPr>
-            <a:normAutofit/>
-          </a:bodyPr>
+          <a:bodyPr/>
           <a:lstStyle/>
           <a:p>
             <a:endParaRPr lang="en-US" dirty="0"/>
@@ -1531,7 +1524,7 @@
     </p:spTree>
     <p:extLst>
       <p:ext uri="{BB962C8B-B14F-4D97-AF65-F5344CB8AC3E}">
-        <p14:creationId xmlns:p14="http://schemas.microsoft.com/office/powerpoint/2010/main" val="3122527666"/>
+        <p14:creationId xmlns:p14="http://schemas.microsoft.com/office/powerpoint/2010/main" val="1449978697"/>
       </p:ext>
     </p:extLst>
   </p:cSld>
@@ -1568,7 +1561,12 @@
             <p:ph type="sldImg"/>
           </p:nvPr>
         </p:nvSpPr>
-        <p:spPr/>
+        <p:spPr>
+          <a:xfrm>
+            <a:off x="381000" y="685800"/>
+            <a:ext cx="6096000" cy="3429000"/>
+          </a:xfrm>
+        </p:spPr>
       </p:sp>
       <p:sp>
         <p:nvSpPr>
@@ -1582,7 +1580,9 @@
         </p:nvSpPr>
         <p:spPr/>
         <p:txBody>
-          <a:bodyPr/>
+          <a:bodyPr>
+            <a:normAutofit/>
+          </a:bodyPr>
           <a:lstStyle/>
           <a:p>
             <a:endParaRPr lang="en-US" dirty="0"/>
@@ -1616,7 +1616,7 @@
     </p:spTree>
     <p:extLst>
       <p:ext uri="{BB962C8B-B14F-4D97-AF65-F5344CB8AC3E}">
-        <p14:creationId xmlns:p14="http://schemas.microsoft.com/office/powerpoint/2010/main" val="1449978697"/>
+        <p14:creationId xmlns:p14="http://schemas.microsoft.com/office/powerpoint/2010/main" val="669895288"/>
       </p:ext>
     </p:extLst>
   </p:cSld>
@@ -25720,23 +25720,92 @@
             <p:ph type="ctrTitle"/>
           </p:nvPr>
         </p:nvSpPr>
-        <p:spPr/>
+        <p:spPr>
+          <a:xfrm>
+            <a:off x="5448301" y="1035107"/>
+            <a:ext cx="6119812" cy="2446092"/>
+          </a:xfrm>
+        </p:spPr>
         <p:txBody>
-          <a:bodyPr anchor="ctr">
-            <a:normAutofit/>
-          </a:bodyPr>
+          <a:bodyPr anchor="t"/>
           <a:lstStyle/>
           <a:p>
-            <a:pPr algn="ctr"/>
             <a:r>
-              <a:rPr lang="en-US" sz="7200" dirty="0" smtClean="0"/>
-              <a:t>Q&amp;A</a:t>
+              <a:rPr lang="en-US" dirty="0" smtClean="0"/>
+              <a:t>Demo</a:t>
             </a:r>
-            <a:endParaRPr lang="en-US" sz="6000" dirty="0">
-              <a:solidFill>
-                <a:schemeClr val="tx1"/>
-              </a:solidFill>
-            </a:endParaRPr>
+            <a:br>
+              <a:rPr lang="en-US" dirty="0" smtClean="0"/>
+            </a:br>
+            <a:r>
+              <a:rPr lang="en-US" sz="2400" b="1" dirty="0" smtClean="0">
+                <a:solidFill>
+                  <a:schemeClr val="tx1"/>
+                </a:solidFill>
+              </a:rPr>
+              <a:t>Subject: Extracting Script rates from Yahoo finance</a:t>
+            </a:r>
+            <a:r>
+              <a:rPr lang="en-US" dirty="0" smtClean="0"/>
+              <a:t/>
+            </a:r>
+            <a:br>
+              <a:rPr lang="en-US" dirty="0" smtClean="0"/>
+            </a:br>
+            <a:endParaRPr lang="en-US" dirty="0"/>
+          </a:p>
+        </p:txBody>
+      </p:sp>
+      <p:sp>
+        <p:nvSpPr>
+          <p:cNvPr id="16" name="Subtitle 15"/>
+          <p:cNvSpPr>
+            <a:spLocks noGrp="1"/>
+          </p:cNvSpPr>
+          <p:nvPr>
+            <p:ph type="subTitle" idx="1"/>
+          </p:nvPr>
+        </p:nvSpPr>
+        <p:spPr>
+          <a:xfrm>
+            <a:off x="5448302" y="3481199"/>
+            <a:ext cx="6119811" cy="1730881"/>
+          </a:xfrm>
+        </p:spPr>
+        <p:txBody>
+          <a:bodyPr/>
+          <a:lstStyle/>
+          <a:p>
+            <a:r>
+              <a:rPr lang="en-US" dirty="0" smtClean="0"/>
+              <a:t>Software: R </a:t>
+            </a:r>
+          </a:p>
+          <a:p>
+            <a:r>
+              <a:rPr lang="en-US" dirty="0" smtClean="0"/>
+              <a:t>IDE:R Studio</a:t>
+            </a:r>
+          </a:p>
+          <a:p>
+            <a:r>
+              <a:rPr lang="en-CA" dirty="0" smtClean="0"/>
+              <a:t>Host: Cloud</a:t>
+            </a:r>
+          </a:p>
+          <a:p>
+            <a:r>
+              <a:rPr lang="en-CA" dirty="0" smtClean="0"/>
+              <a:t>URL</a:t>
+            </a:r>
+            <a:r>
+              <a:rPr lang="en-CA" dirty="0"/>
+              <a:t>: https://rstudio.cloud</a:t>
+            </a:r>
+            <a:endParaRPr lang="en-US" dirty="0" smtClean="0"/>
+          </a:p>
+          <a:p>
+            <a:endParaRPr lang="en-US" dirty="0"/>
           </a:p>
         </p:txBody>
       </p:sp>
@@ -25767,7 +25836,7 @@
     </p:spTree>
     <p:extLst>
       <p:ext uri="{BB962C8B-B14F-4D97-AF65-F5344CB8AC3E}">
-        <p14:creationId xmlns:p14="http://schemas.microsoft.com/office/powerpoint/2010/main" val="96958150"/>
+        <p14:creationId xmlns:p14="http://schemas.microsoft.com/office/powerpoint/2010/main" val="426337725"/>
       </p:ext>
     </p:extLst>
   </p:cSld>
@@ -25916,7 +25985,7 @@
             </a:pPr>
             <a:r>
               <a:rPr lang="en-CA" sz="2400" dirty="0" smtClean="0"/>
-              <a:t>References</a:t>
+              <a:t>Q&amp;A</a:t>
             </a:r>
           </a:p>
           <a:p>
@@ -25931,9 +26000,20 @@
               <a:buChar char="•"/>
             </a:pPr>
             <a:r>
-              <a:rPr lang="en-CA" sz="2400" dirty="0" smtClean="0"/>
-              <a:t>Q&amp;A</a:t>
+              <a:rPr lang="en-CA" sz="2400"/>
+              <a:t>References</a:t>
             </a:r>
+          </a:p>
+          <a:p>
+            <a:pPr>
+              <a:spcBef>
+                <a:spcPts val="0"/>
+              </a:spcBef>
+              <a:spcAft>
+                <a:spcPts val="500"/>
+              </a:spcAft>
+            </a:pPr>
+            <a:endParaRPr lang="en-CA" sz="2400" dirty="0" smtClean="0"/>
           </a:p>
           <a:p>
             <a:pPr>
@@ -27146,9 +27226,6 @@
               </a:rPr>
               <a:t>https://www.freecodecamp.org/news/an-introduction-to-web-scraping-using-r-40284110c848/</a:t>
             </a:r>
-            <a:endParaRPr lang="en-US" dirty="0">
-              <a:cs typeface="Arial" pitchFamily="34" charset="0"/>
-            </a:endParaRPr>
           </a:p>
           <a:p>
             <a:pPr>
@@ -27234,106 +27311,33 @@
       </p:grpSpPr>
       <p:sp>
         <p:nvSpPr>
-          <p:cNvPr id="2" name="Title 1"/>
+          <p:cNvPr id="19" name="Title 18"/>
           <p:cNvSpPr>
             <a:spLocks noGrp="1"/>
           </p:cNvSpPr>
           <p:nvPr>
-            <p:ph type="ctrTitle"/>
+            <p:ph type="title"/>
           </p:nvPr>
         </p:nvSpPr>
-        <p:spPr>
-          <a:xfrm>
-            <a:off x="5448301" y="1035107"/>
-            <a:ext cx="6119812" cy="2446092"/>
-          </a:xfrm>
-        </p:spPr>
+        <p:spPr/>
         <p:txBody>
-          <a:bodyPr anchor="t"/>
+          <a:bodyPr anchor="ctr">
+            <a:noAutofit/>
+          </a:bodyPr>
           <a:lstStyle/>
           <a:p>
+            <a:pPr algn="ctr"/>
             <a:r>
-              <a:rPr lang="en-US" dirty="0" smtClean="0"/>
-              <a:t>Demo</a:t>
+              <a:rPr lang="en-US" sz="7200" dirty="0" smtClean="0"/>
+              <a:t>Thank you !!!!!!!!</a:t>
             </a:r>
-            <a:br>
-              <a:rPr lang="en-US" dirty="0" smtClean="0"/>
-            </a:br>
-            <a:r>
-              <a:rPr lang="en-US" sz="2400" b="1" dirty="0" smtClean="0">
-                <a:solidFill>
-                  <a:schemeClr val="tx1"/>
-                </a:solidFill>
-              </a:rPr>
-              <a:t>Subject: Extracting Script rates from Yahoo finance</a:t>
-            </a:r>
-            <a:r>
-              <a:rPr lang="en-US" dirty="0" smtClean="0"/>
-              <a:t/>
-            </a:r>
-            <a:br>
-              <a:rPr lang="en-US" dirty="0" smtClean="0"/>
-            </a:br>
-            <a:endParaRPr lang="en-US" dirty="0"/>
+            <a:endParaRPr lang="en-US" sz="7200" dirty="0"/>
           </a:p>
         </p:txBody>
       </p:sp>
       <p:sp>
         <p:nvSpPr>
-          <p:cNvPr id="16" name="Subtitle 15"/>
-          <p:cNvSpPr>
-            <a:spLocks noGrp="1"/>
-          </p:cNvSpPr>
-          <p:nvPr>
-            <p:ph type="subTitle" idx="1"/>
-          </p:nvPr>
-        </p:nvSpPr>
-        <p:spPr>
-          <a:xfrm>
-            <a:off x="5448302" y="3481199"/>
-            <a:ext cx="6119811" cy="1730881"/>
-          </a:xfrm>
-        </p:spPr>
-        <p:txBody>
-          <a:bodyPr/>
-          <a:lstStyle/>
-          <a:p>
-            <a:r>
-              <a:rPr lang="en-US" dirty="0" smtClean="0"/>
-              <a:t>Software: R </a:t>
-            </a:r>
-          </a:p>
-          <a:p>
-            <a:r>
-              <a:rPr lang="en-US" dirty="0" smtClean="0"/>
-              <a:t>IDE:R Studio</a:t>
-            </a:r>
-          </a:p>
-          <a:p>
-            <a:r>
-              <a:rPr lang="en-CA" dirty="0" smtClean="0"/>
-              <a:t>Host: Cloud</a:t>
-            </a:r>
-          </a:p>
-          <a:p>
-            <a:r>
-              <a:rPr lang="en-CA" dirty="0" smtClean="0"/>
-              <a:t>URL</a:t>
-            </a:r>
-            <a:r>
-              <a:rPr lang="en-CA" dirty="0"/>
-              <a:t>: https://rstudio.cloud</a:t>
-            </a:r>
-            <a:endParaRPr lang="en-US" dirty="0" smtClean="0"/>
-          </a:p>
-          <a:p>
-            <a:endParaRPr lang="en-US" dirty="0"/>
-          </a:p>
-        </p:txBody>
-      </p:sp>
-      <p:sp>
-        <p:nvSpPr>
-          <p:cNvPr id="4" name="Slide Number Placeholder 3"/>
+          <p:cNvPr id="7" name="Slide Number Placeholder 6"/>
           <p:cNvSpPr>
             <a:spLocks noGrp="1"/>
           </p:cNvSpPr>
@@ -27358,7 +27362,7 @@
     </p:spTree>
     <p:extLst>
       <p:ext uri="{BB962C8B-B14F-4D97-AF65-F5344CB8AC3E}">
-        <p14:creationId xmlns:p14="http://schemas.microsoft.com/office/powerpoint/2010/main" val="426337725"/>
+        <p14:creationId xmlns:p14="http://schemas.microsoft.com/office/powerpoint/2010/main" val="24715724"/>
       </p:ext>
     </p:extLst>
   </p:cSld>
@@ -27394,33 +27398,37 @@
       </p:grpSpPr>
       <p:sp>
         <p:nvSpPr>
-          <p:cNvPr id="19" name="Title 18"/>
+          <p:cNvPr id="2" name="Title 1"/>
           <p:cNvSpPr>
             <a:spLocks noGrp="1"/>
           </p:cNvSpPr>
           <p:nvPr>
-            <p:ph type="title"/>
+            <p:ph type="ctrTitle"/>
           </p:nvPr>
         </p:nvSpPr>
         <p:spPr/>
         <p:txBody>
           <a:bodyPr anchor="ctr">
-            <a:noAutofit/>
+            <a:normAutofit/>
           </a:bodyPr>
           <a:lstStyle/>
           <a:p>
             <a:pPr algn="ctr"/>
             <a:r>
               <a:rPr lang="en-US" sz="7200" dirty="0" smtClean="0"/>
-              <a:t>Thank you !!!!!!!!</a:t>
+              <a:t>Q&amp;A</a:t>
             </a:r>
-            <a:endParaRPr lang="en-US" sz="7200" dirty="0"/>
+            <a:endParaRPr lang="en-US" sz="6000" dirty="0">
+              <a:solidFill>
+                <a:schemeClr val="tx1"/>
+              </a:solidFill>
+            </a:endParaRPr>
           </a:p>
         </p:txBody>
       </p:sp>
       <p:sp>
         <p:nvSpPr>
-          <p:cNvPr id="7" name="Slide Number Placeholder 6"/>
+          <p:cNvPr id="4" name="Slide Number Placeholder 3"/>
           <p:cNvSpPr>
             <a:spLocks noGrp="1"/>
           </p:cNvSpPr>
@@ -27445,7 +27453,7 @@
     </p:spTree>
     <p:extLst>
       <p:ext uri="{BB962C8B-B14F-4D97-AF65-F5344CB8AC3E}">
-        <p14:creationId xmlns:p14="http://schemas.microsoft.com/office/powerpoint/2010/main" val="24715724"/>
+        <p14:creationId xmlns:p14="http://schemas.microsoft.com/office/powerpoint/2010/main" val="96958150"/>
       </p:ext>
     </p:extLst>
   </p:cSld>
@@ -28503,84 +28511,139 @@
 </file>
 
 <file path=customXml/item2.xml><?xml version="1.0" encoding="utf-8"?>
-<p:properties xmlns:p="http://schemas.microsoft.com/office/2006/metadata/properties" xmlns:xsi="http://www.w3.org/2001/XMLSchema-instance">
-  <documentManagement>
-    <c5aebc35b3e840e5912c276ffe755dcf xmlns="d95a5b16-1b8d-4c7c-9ebf-89c0983b6970">
-      <Terms xmlns="http://schemas.microsoft.com/office/infopath/2007/PartnerControls"/>
-    </c5aebc35b3e840e5912c276ffe755dcf>
-    <c79d12643ffc4d60ab657aaa1718cc32 xmlns="d95a5b16-1b8d-4c7c-9ebf-89c0983b6970">
-      <Terms xmlns="http://schemas.microsoft.com/office/infopath/2007/PartnerControls">
-        <TermInfo xmlns="http://schemas.microsoft.com/office/infopath/2007/PartnerControls">
-          <TermName xmlns="http://schemas.microsoft.com/office/infopath/2007/PartnerControls">Corporate</TermName>
-          <TermId xmlns="http://schemas.microsoft.com/office/infopath/2007/PartnerControls">43ac7042-3752-4f1b-8a93-43b36e65d3e5</TermId>
-        </TermInfo>
-      </Terms>
-    </c79d12643ffc4d60ab657aaa1718cc32>
-    <p43f7bb208e443c9b50eb304fe6606a3 xmlns="d95a5b16-1b8d-4c7c-9ebf-89c0983b6970">
-      <Terms xmlns="http://schemas.microsoft.com/office/infopath/2007/PartnerControls"/>
-    </p43f7bb208e443c9b50eb304fe6606a3>
-    <TaxCatchAll xmlns="d95a5b16-1b8d-4c7c-9ebf-89c0983b6970">
-      <Value>260</Value>
-      <Value>46118</Value>
-      <Value>3697</Value>
-      <Value>46486</Value>
-    </TaxCatchAll>
-    <eafb632c3f5c40ba98242be6bbd6bb17 xmlns="d95a5b16-1b8d-4c7c-9ebf-89c0983b6970">
-      <Terms xmlns="http://schemas.microsoft.com/office/infopath/2007/PartnerControls"/>
-    </eafb632c3f5c40ba98242be6bbd6bb17>
-    <b0f7c43cb32a4bb99696cc0157e407bc xmlns="d95a5b16-1b8d-4c7c-9ebf-89c0983b6970">
-      <Terms xmlns="http://schemas.microsoft.com/office/infopath/2007/PartnerControls"/>
-    </b0f7c43cb32a4bb99696cc0157e407bc>
-    <gd9a5f5f69a84d75ad992b5cd341c76b xmlns="d95a5b16-1b8d-4c7c-9ebf-89c0983b6970">
-      <Terms xmlns="http://schemas.microsoft.com/office/infopath/2007/PartnerControls"/>
-    </gd9a5f5f69a84d75ad992b5cd341c76b>
-    <o5847c86b23d428c853490e0a9abf024 xmlns="d95a5b16-1b8d-4c7c-9ebf-89c0983b6970">
-      <Terms xmlns="http://schemas.microsoft.com/office/infopath/2007/PartnerControls"/>
-    </o5847c86b23d428c853490e0a9abf024>
-    <kbc8ce58d0914d5e9641963f23cd2adf xmlns="d95a5b16-1b8d-4c7c-9ebf-89c0983b6970">
-      <Terms xmlns="http://schemas.microsoft.com/office/infopath/2007/PartnerControls">
-        <TermInfo xmlns="http://schemas.microsoft.com/office/infopath/2007/PartnerControls">
-          <TermName xmlns="http://schemas.microsoft.com/office/infopath/2007/PartnerControls">Communications ＆ Investor Relations</TermName>
-          <TermId xmlns="http://schemas.microsoft.com/office/infopath/2007/PartnerControls">fb65bde5-f439-4af8-aaa0-dcf1364d6414</TermId>
-        </TermInfo>
-      </Terms>
-    </kbc8ce58d0914d5e9641963f23cd2adf>
-    <ae4bb7bb5e1849a3a75b9d2ac781ba53 xmlns="d95a5b16-1b8d-4c7c-9ebf-89c0983b6970">
-      <Terms xmlns="http://schemas.microsoft.com/office/infopath/2007/PartnerControls">
-        <TermInfo xmlns="http://schemas.microsoft.com/office/infopath/2007/PartnerControls">
-          <TermName xmlns="http://schemas.microsoft.com/office/infopath/2007/PartnerControls">Brand template</TermName>
-          <TermId xmlns="http://schemas.microsoft.com/office/infopath/2007/PartnerControls">a8dae13e-44bb-4ec1-860e-cc2305177641</TermId>
-        </TermInfo>
-      </Terms>
-    </ae4bb7bb5e1849a3a75b9d2ac781ba53>
-    <Creator xmlns="d95a5b16-1b8d-4c7c-9ebf-89c0983b6970" xsi:nil="true"/>
-    <Language xmlns="http://schemas.microsoft.com/sharepoint/v3">EN</Language>
-    <CSMeta2010Field xmlns="http://schemas.microsoft.com/sharepoint/v3">cf78e423-0039-41cd-b5ec-35c354449ae3;2019-08-12 17:17:32;PARTIALMANUALCLASSIFIED;Topic:2019-08-12 17:17:32|False||AUTOCLASSIFIED|2019-08-12 17:17:32|UNDEFINED|00000000-0000-0000-0000-000000000000;Organization:2018-06-14 16:30:37|False|2018-06-14 16:34:19|MANUALCLASSIFIED|2018-06-14 16:34:19|UNDEFINED|00000000-0000-0000-0000-000000000000;Industry:2019-08-12 17:17:32|False||AUTOCLASSIFIED|2019-08-12 17:17:32|UNDEFINED|00000000-0000-0000-0000-000000000000;Service line:2019-08-12 17:17:32|False||AUTOCLASSIFIED|2019-08-12 17:17:32|UNDEFINED|00000000-0000-0000-0000-000000000000;Business Practice:2019-08-12 17:17:32|False||AUTOCLASSIFIED|2019-08-12 17:17:32|UNDEFINED|00000000-0000-0000-0000-000000000000;Intellectual Property:2019-08-12 17:17:32|False||AUTOCLASSIFIED|2019-08-12 17:17:32|UNDEFINED|00000000-0000-0000-0000-000000000000;Content Format:2018-06-14 16:30:37|False|2018-06-14 16:34:19|MANUALCLASSIFIED|2018-06-14 16:34:19|UNDEFINED|00000000-0000-0000-0000-000000000000;Functions:2019-08-12 17:17:32|False||AUTOCLASSIFIED|2019-08-12 17:17:32|UNDEFINED|00000000-0000-0000-0000-000000000000;Geography:2019-08-12 17:17:32|False||AUTOCLASSIFIED|2019-08-12 17:17:32|UNDEFINED|00000000-0000-0000-0000-000000000000;False</CSMeta2010Field>
-    <Abstract xmlns="d95a5b16-1b8d-4c7c-9ebf-89c0983b6970">CGI widescreen graphic PowerPoint template - English version</Abstract>
-    <External_x0020_Use xmlns="d95a5b16-1b8d-4c7c-9ebf-89c0983b6970">No</External_x0020_Use>
-    <Owner_x0020_Organisation xmlns="d95a5b16-1b8d-4c7c-9ebf-89c0983b6970">Group</Owner_x0020_Organisation>
-    <BS_x0020_Document_x0020_Sub_x0020_Type xmlns="d95a5b16-1b8d-4c7c-9ebf-89c0983b6970">Business Aid</BS_x0020_Document_x0020_Sub_x0020_Type>
-    <Market xmlns="d95a5b16-1b8d-4c7c-9ebf-89c0983b6970"/>
-    <TaxKeywordTaxHTField xmlns="d95a5b16-1b8d-4c7c-9ebf-89c0983b6970">
-      <Terms xmlns="http://schemas.microsoft.com/office/infopath/2007/PartnerControls">
-        <TermInfo xmlns="http://schemas.microsoft.com/office/infopath/2007/PartnerControls">
-          <TermName xmlns="http://schemas.microsoft.com/office/infopath/2007/PartnerControls">PowerPoint</TermName>
-          <TermId xmlns="http://schemas.microsoft.com/office/infopath/2007/PartnerControls">5b4ca844-900d-4151-9c88-1a4b47550bee</TermId>
-        </TermInfo>
-      </Terms>
-    </TaxKeywordTaxHTField>
-    <Best_x0020_Before_x0020_Date xmlns="d95a5b16-1b8d-4c7c-9ebf-89c0983b6970">2023-06-13T23:00:00+00:00</Best_x0020_Before_x0020_Date>
-    <Published_x0020_By xmlns="d95a5b16-1b8d-4c7c-9ebf-89c0983b6970">
-      <UserInfo>
-        <DisplayName>Stiller, Regina C</DisplayName>
-        <AccountId>55167</AccountId>
-        <AccountType/>
-      </UserInfo>
-    </Published_x0020_By>
-    <Publication_x0020_Date xmlns="d95a5b16-1b8d-4c7c-9ebf-89c0983b6970">2018-06-13T23:00:00+00:00</Publication_x0020_Date>
-    <Geographic_x0020_Region xmlns="d95a5b16-1b8d-4c7c-9ebf-89c0983b6970"/>
-  </documentManagement>
-</p:properties>
+<?mso-contentType ?>
+<spe:Receivers xmlns:spe="http://schemas.microsoft.com/sharepoint/events">
+  <Receiver>
+    <Name>ItemUpdatedEventHandlerForConceptSearch</Name>
+    <Synchronization>Default</Synchronization>
+    <Type>10002</Type>
+    <SequenceNumber>10001</SequenceNumber>
+    <Assembly>conceptSearching.Sharepoint.ContentTypes, Version=1.0.0.0, Culture=neutral, PublicKeyToken=858f8f13980e4745</Assembly>
+    <Class>conceptSearching.Sharepoint.ContentTypes.CSHandleEvent</Class>
+    <Data/>
+    <Filter/>
+  </Receiver>
+  <Receiver>
+    <Name>ItemCheckedInEventHandlerForConceptSearch</Name>
+    <Synchronization>Default</Synchronization>
+    <Type>10004</Type>
+    <SequenceNumber>10002</SequenceNumber>
+    <Assembly>conceptSearching.Sharepoint.ContentTypes, Version=1.0.0.0, Culture=neutral, PublicKeyToken=858f8f13980e4745</Assembly>
+    <Class>conceptSearching.Sharepoint.ContentTypes.CSHandleEvent</Class>
+    <Data/>
+    <Filter/>
+  </Receiver>
+  <Receiver>
+    <Name>ItemUncheckedOutEventHandlerForConceptSearch</Name>
+    <Synchronization>Default</Synchronization>
+    <Type>10006</Type>
+    <SequenceNumber>10003</SequenceNumber>
+    <Assembly>conceptSearching.Sharepoint.ContentTypes, Version=1.0.0.0, Culture=neutral, PublicKeyToken=858f8f13980e4745</Assembly>
+    <Class>conceptSearching.Sharepoint.ContentTypes.CSHandleEvent</Class>
+    <Data/>
+    <Filter/>
+  </Receiver>
+  <Receiver>
+    <Name>ItemAddedEventHandlerForConceptSearch</Name>
+    <Synchronization>Default</Synchronization>
+    <Type>10001</Type>
+    <SequenceNumber>10004</SequenceNumber>
+    <Assembly>conceptSearching.Sharepoint.ContentTypes, Version=1.0.0.0, Culture=neutral, PublicKeyToken=858f8f13980e4745</Assembly>
+    <Class>conceptSearching.Sharepoint.ContentTypes.CSHandleEvent</Class>
+    <Data/>
+    <Filter/>
+  </Receiver>
+  <Receiver>
+    <Name>ItemFileMovedEventHandlerForConceptSearch</Name>
+    <Synchronization>Default</Synchronization>
+    <Type>10009</Type>
+    <SequenceNumber>10005</SequenceNumber>
+    <Assembly>conceptSearching.Sharepoint.ContentTypes, Version=1.0.0.0, Culture=neutral, PublicKeyToken=858f8f13980e4745</Assembly>
+    <Class>conceptSearching.Sharepoint.ContentTypes.CSHandleEvent</Class>
+    <Data/>
+    <Filter/>
+  </Receiver>
+  <Receiver>
+    <Name>ItemDeletedEventHandlerForConceptSearch</Name>
+    <Synchronization>Default</Synchronization>
+    <Type>10003</Type>
+    <SequenceNumber>10006</SequenceNumber>
+    <Assembly>conceptSearching.Sharepoint.ContentTypes, Version=1.0.0.0, Culture=neutral, PublicKeyToken=858f8f13980e4745</Assembly>
+    <Class>conceptSearching.Sharepoint.ContentTypes.CSHandleEvent</Class>
+    <Data/>
+    <Filter/>
+  </Receiver>
+  <Receiver>
+    <Name>ItemUpdatedEventHandlerForConceptSearch</Name>
+    <Synchronization>Asynchronous</Synchronization>
+    <Type>10002</Type>
+    <SequenceNumber>10001</SequenceNumber>
+    <Assembly>conceptSearching.Sharepoint.ContentTypes2010, Version=1.0.0.0, Culture=neutral, PublicKeyToken=858f8f13980e4745</Assembly>
+    <Class>conceptSearching.Sharepoint.ContentTypes2010.CSHandleEvent</Class>
+    <Data/>
+    <Filter/>
+  </Receiver>
+  <Receiver>
+    <Name>ItemUpdatingEventHandlerForConceptSearch</Name>
+    <Synchronization>Synchronous</Synchronization>
+    <Type>2</Type>
+    <SequenceNumber>10001</SequenceNumber>
+    <Assembly>conceptSearching.Sharepoint.ContentTypes2010, Version=1.0.0.0, Culture=neutral, PublicKeyToken=858f8f13980e4745</Assembly>
+    <Class>conceptSearching.Sharepoint.ContentTypes2010.CSHandleEvent</Class>
+    <Data/>
+    <Filter/>
+  </Receiver>
+  <Receiver>
+    <Name>ItemCheckedInEventHandlerForConceptSearch</Name>
+    <Synchronization>Asynchronous</Synchronization>
+    <Type>10004</Type>
+    <SequenceNumber>10002</SequenceNumber>
+    <Assembly>conceptSearching.Sharepoint.ContentTypes2010, Version=1.0.0.0, Culture=neutral, PublicKeyToken=858f8f13980e4745</Assembly>
+    <Class>conceptSearching.Sharepoint.ContentTypes2010.CSHandleEvent</Class>
+    <Data/>
+    <Filter/>
+  </Receiver>
+  <Receiver>
+    <Name>ItemUncheckedOutEventHandlerForConceptSearch</Name>
+    <Synchronization>Asynchronous</Synchronization>
+    <Type>10006</Type>
+    <SequenceNumber>10003</SequenceNumber>
+    <Assembly>conceptSearching.Sharepoint.ContentTypes2010, Version=1.0.0.0, Culture=neutral, PublicKeyToken=858f8f13980e4745</Assembly>
+    <Class>conceptSearching.Sharepoint.ContentTypes2010.CSHandleEvent</Class>
+    <Data/>
+    <Filter/>
+  </Receiver>
+  <Receiver>
+    <Name>ItemAddedEventHandlerForConceptSearch</Name>
+    <Synchronization>Asynchronous</Synchronization>
+    <Type>10001</Type>
+    <SequenceNumber>10004</SequenceNumber>
+    <Assembly>conceptSearching.Sharepoint.ContentTypes2010, Version=1.0.0.0, Culture=neutral, PublicKeyToken=858f8f13980e4745</Assembly>
+    <Class>conceptSearching.Sharepoint.ContentTypes2010.CSHandleEvent</Class>
+    <Data/>
+    <Filter/>
+  </Receiver>
+  <Receiver>
+    <Name>ItemFileMovedEventHandlerForConceptSearch</Name>
+    <Synchronization>Asynchronous</Synchronization>
+    <Type>10009</Type>
+    <SequenceNumber>10005</SequenceNumber>
+    <Assembly>conceptSearching.Sharepoint.ContentTypes2010, Version=1.0.0.0, Culture=neutral, PublicKeyToken=858f8f13980e4745</Assembly>
+    <Class>conceptSearching.Sharepoint.ContentTypes2010.CSHandleEvent</Class>
+    <Data/>
+    <Filter/>
+  </Receiver>
+  <Receiver>
+    <Name>ItemDeletedEventHandlerForConceptSearch</Name>
+    <Synchronization>Asynchronous</Synchronization>
+    <Type>10003</Type>
+    <SequenceNumber>10006</SequenceNumber>
+    <Assembly>conceptSearching.Sharepoint.ContentTypes2010, Version=1.0.0.0, Culture=neutral, PublicKeyToken=858f8f13980e4745</Assembly>
+    <Class>conceptSearching.Sharepoint.ContentTypes2010.CSHandleEvent</Class>
+    <Data/>
+    <Filter/>
+  </Receiver>
+</spe:Receivers>
 </file>
 
 <file path=customXml/item3.xml><?xml version="1.0" encoding="utf-8"?>
@@ -29032,139 +29095,84 @@
 </file>
 
 <file path=customXml/item4.xml><?xml version="1.0" encoding="utf-8"?>
-<?mso-contentType ?>
-<spe:Receivers xmlns:spe="http://schemas.microsoft.com/sharepoint/events">
-  <Receiver>
-    <Name>ItemUpdatedEventHandlerForConceptSearch</Name>
-    <Synchronization>Default</Synchronization>
-    <Type>10002</Type>
-    <SequenceNumber>10001</SequenceNumber>
-    <Assembly>conceptSearching.Sharepoint.ContentTypes, Version=1.0.0.0, Culture=neutral, PublicKeyToken=858f8f13980e4745</Assembly>
-    <Class>conceptSearching.Sharepoint.ContentTypes.CSHandleEvent</Class>
-    <Data/>
-    <Filter/>
-  </Receiver>
-  <Receiver>
-    <Name>ItemCheckedInEventHandlerForConceptSearch</Name>
-    <Synchronization>Default</Synchronization>
-    <Type>10004</Type>
-    <SequenceNumber>10002</SequenceNumber>
-    <Assembly>conceptSearching.Sharepoint.ContentTypes, Version=1.0.0.0, Culture=neutral, PublicKeyToken=858f8f13980e4745</Assembly>
-    <Class>conceptSearching.Sharepoint.ContentTypes.CSHandleEvent</Class>
-    <Data/>
-    <Filter/>
-  </Receiver>
-  <Receiver>
-    <Name>ItemUncheckedOutEventHandlerForConceptSearch</Name>
-    <Synchronization>Default</Synchronization>
-    <Type>10006</Type>
-    <SequenceNumber>10003</SequenceNumber>
-    <Assembly>conceptSearching.Sharepoint.ContentTypes, Version=1.0.0.0, Culture=neutral, PublicKeyToken=858f8f13980e4745</Assembly>
-    <Class>conceptSearching.Sharepoint.ContentTypes.CSHandleEvent</Class>
-    <Data/>
-    <Filter/>
-  </Receiver>
-  <Receiver>
-    <Name>ItemAddedEventHandlerForConceptSearch</Name>
-    <Synchronization>Default</Synchronization>
-    <Type>10001</Type>
-    <SequenceNumber>10004</SequenceNumber>
-    <Assembly>conceptSearching.Sharepoint.ContentTypes, Version=1.0.0.0, Culture=neutral, PublicKeyToken=858f8f13980e4745</Assembly>
-    <Class>conceptSearching.Sharepoint.ContentTypes.CSHandleEvent</Class>
-    <Data/>
-    <Filter/>
-  </Receiver>
-  <Receiver>
-    <Name>ItemFileMovedEventHandlerForConceptSearch</Name>
-    <Synchronization>Default</Synchronization>
-    <Type>10009</Type>
-    <SequenceNumber>10005</SequenceNumber>
-    <Assembly>conceptSearching.Sharepoint.ContentTypes, Version=1.0.0.0, Culture=neutral, PublicKeyToken=858f8f13980e4745</Assembly>
-    <Class>conceptSearching.Sharepoint.ContentTypes.CSHandleEvent</Class>
-    <Data/>
-    <Filter/>
-  </Receiver>
-  <Receiver>
-    <Name>ItemDeletedEventHandlerForConceptSearch</Name>
-    <Synchronization>Default</Synchronization>
-    <Type>10003</Type>
-    <SequenceNumber>10006</SequenceNumber>
-    <Assembly>conceptSearching.Sharepoint.ContentTypes, Version=1.0.0.0, Culture=neutral, PublicKeyToken=858f8f13980e4745</Assembly>
-    <Class>conceptSearching.Sharepoint.ContentTypes.CSHandleEvent</Class>
-    <Data/>
-    <Filter/>
-  </Receiver>
-  <Receiver>
-    <Name>ItemUpdatedEventHandlerForConceptSearch</Name>
-    <Synchronization>Asynchronous</Synchronization>
-    <Type>10002</Type>
-    <SequenceNumber>10001</SequenceNumber>
-    <Assembly>conceptSearching.Sharepoint.ContentTypes2010, Version=1.0.0.0, Culture=neutral, PublicKeyToken=858f8f13980e4745</Assembly>
-    <Class>conceptSearching.Sharepoint.ContentTypes2010.CSHandleEvent</Class>
-    <Data/>
-    <Filter/>
-  </Receiver>
-  <Receiver>
-    <Name>ItemUpdatingEventHandlerForConceptSearch</Name>
-    <Synchronization>Synchronous</Synchronization>
-    <Type>2</Type>
-    <SequenceNumber>10001</SequenceNumber>
-    <Assembly>conceptSearching.Sharepoint.ContentTypes2010, Version=1.0.0.0, Culture=neutral, PublicKeyToken=858f8f13980e4745</Assembly>
-    <Class>conceptSearching.Sharepoint.ContentTypes2010.CSHandleEvent</Class>
-    <Data/>
-    <Filter/>
-  </Receiver>
-  <Receiver>
-    <Name>ItemCheckedInEventHandlerForConceptSearch</Name>
-    <Synchronization>Asynchronous</Synchronization>
-    <Type>10004</Type>
-    <SequenceNumber>10002</SequenceNumber>
-    <Assembly>conceptSearching.Sharepoint.ContentTypes2010, Version=1.0.0.0, Culture=neutral, PublicKeyToken=858f8f13980e4745</Assembly>
-    <Class>conceptSearching.Sharepoint.ContentTypes2010.CSHandleEvent</Class>
-    <Data/>
-    <Filter/>
-  </Receiver>
-  <Receiver>
-    <Name>ItemUncheckedOutEventHandlerForConceptSearch</Name>
-    <Synchronization>Asynchronous</Synchronization>
-    <Type>10006</Type>
-    <SequenceNumber>10003</SequenceNumber>
-    <Assembly>conceptSearching.Sharepoint.ContentTypes2010, Version=1.0.0.0, Culture=neutral, PublicKeyToken=858f8f13980e4745</Assembly>
-    <Class>conceptSearching.Sharepoint.ContentTypes2010.CSHandleEvent</Class>
-    <Data/>
-    <Filter/>
-  </Receiver>
-  <Receiver>
-    <Name>ItemAddedEventHandlerForConceptSearch</Name>
-    <Synchronization>Asynchronous</Synchronization>
-    <Type>10001</Type>
-    <SequenceNumber>10004</SequenceNumber>
-    <Assembly>conceptSearching.Sharepoint.ContentTypes2010, Version=1.0.0.0, Culture=neutral, PublicKeyToken=858f8f13980e4745</Assembly>
-    <Class>conceptSearching.Sharepoint.ContentTypes2010.CSHandleEvent</Class>
-    <Data/>
-    <Filter/>
-  </Receiver>
-  <Receiver>
-    <Name>ItemFileMovedEventHandlerForConceptSearch</Name>
-    <Synchronization>Asynchronous</Synchronization>
-    <Type>10009</Type>
-    <SequenceNumber>10005</SequenceNumber>
-    <Assembly>conceptSearching.Sharepoint.ContentTypes2010, Version=1.0.0.0, Culture=neutral, PublicKeyToken=858f8f13980e4745</Assembly>
-    <Class>conceptSearching.Sharepoint.ContentTypes2010.CSHandleEvent</Class>
-    <Data/>
-    <Filter/>
-  </Receiver>
-  <Receiver>
-    <Name>ItemDeletedEventHandlerForConceptSearch</Name>
-    <Synchronization>Asynchronous</Synchronization>
-    <Type>10003</Type>
-    <SequenceNumber>10006</SequenceNumber>
-    <Assembly>conceptSearching.Sharepoint.ContentTypes2010, Version=1.0.0.0, Culture=neutral, PublicKeyToken=858f8f13980e4745</Assembly>
-    <Class>conceptSearching.Sharepoint.ContentTypes2010.CSHandleEvent</Class>
-    <Data/>
-    <Filter/>
-  </Receiver>
-</spe:Receivers>
+<p:properties xmlns:p="http://schemas.microsoft.com/office/2006/metadata/properties" xmlns:xsi="http://www.w3.org/2001/XMLSchema-instance">
+  <documentManagement>
+    <c5aebc35b3e840e5912c276ffe755dcf xmlns="d95a5b16-1b8d-4c7c-9ebf-89c0983b6970">
+      <Terms xmlns="http://schemas.microsoft.com/office/infopath/2007/PartnerControls"/>
+    </c5aebc35b3e840e5912c276ffe755dcf>
+    <c79d12643ffc4d60ab657aaa1718cc32 xmlns="d95a5b16-1b8d-4c7c-9ebf-89c0983b6970">
+      <Terms xmlns="http://schemas.microsoft.com/office/infopath/2007/PartnerControls">
+        <TermInfo xmlns="http://schemas.microsoft.com/office/infopath/2007/PartnerControls">
+          <TermName xmlns="http://schemas.microsoft.com/office/infopath/2007/PartnerControls">Corporate</TermName>
+          <TermId xmlns="http://schemas.microsoft.com/office/infopath/2007/PartnerControls">43ac7042-3752-4f1b-8a93-43b36e65d3e5</TermId>
+        </TermInfo>
+      </Terms>
+    </c79d12643ffc4d60ab657aaa1718cc32>
+    <p43f7bb208e443c9b50eb304fe6606a3 xmlns="d95a5b16-1b8d-4c7c-9ebf-89c0983b6970">
+      <Terms xmlns="http://schemas.microsoft.com/office/infopath/2007/PartnerControls"/>
+    </p43f7bb208e443c9b50eb304fe6606a3>
+    <TaxCatchAll xmlns="d95a5b16-1b8d-4c7c-9ebf-89c0983b6970">
+      <Value>260</Value>
+      <Value>46118</Value>
+      <Value>3697</Value>
+      <Value>46486</Value>
+    </TaxCatchAll>
+    <eafb632c3f5c40ba98242be6bbd6bb17 xmlns="d95a5b16-1b8d-4c7c-9ebf-89c0983b6970">
+      <Terms xmlns="http://schemas.microsoft.com/office/infopath/2007/PartnerControls"/>
+    </eafb632c3f5c40ba98242be6bbd6bb17>
+    <b0f7c43cb32a4bb99696cc0157e407bc xmlns="d95a5b16-1b8d-4c7c-9ebf-89c0983b6970">
+      <Terms xmlns="http://schemas.microsoft.com/office/infopath/2007/PartnerControls"/>
+    </b0f7c43cb32a4bb99696cc0157e407bc>
+    <gd9a5f5f69a84d75ad992b5cd341c76b xmlns="d95a5b16-1b8d-4c7c-9ebf-89c0983b6970">
+      <Terms xmlns="http://schemas.microsoft.com/office/infopath/2007/PartnerControls"/>
+    </gd9a5f5f69a84d75ad992b5cd341c76b>
+    <o5847c86b23d428c853490e0a9abf024 xmlns="d95a5b16-1b8d-4c7c-9ebf-89c0983b6970">
+      <Terms xmlns="http://schemas.microsoft.com/office/infopath/2007/PartnerControls"/>
+    </o5847c86b23d428c853490e0a9abf024>
+    <kbc8ce58d0914d5e9641963f23cd2adf xmlns="d95a5b16-1b8d-4c7c-9ebf-89c0983b6970">
+      <Terms xmlns="http://schemas.microsoft.com/office/infopath/2007/PartnerControls">
+        <TermInfo xmlns="http://schemas.microsoft.com/office/infopath/2007/PartnerControls">
+          <TermName xmlns="http://schemas.microsoft.com/office/infopath/2007/PartnerControls">Communications ＆ Investor Relations</TermName>
+          <TermId xmlns="http://schemas.microsoft.com/office/infopath/2007/PartnerControls">fb65bde5-f439-4af8-aaa0-dcf1364d6414</TermId>
+        </TermInfo>
+      </Terms>
+    </kbc8ce58d0914d5e9641963f23cd2adf>
+    <ae4bb7bb5e1849a3a75b9d2ac781ba53 xmlns="d95a5b16-1b8d-4c7c-9ebf-89c0983b6970">
+      <Terms xmlns="http://schemas.microsoft.com/office/infopath/2007/PartnerControls">
+        <TermInfo xmlns="http://schemas.microsoft.com/office/infopath/2007/PartnerControls">
+          <TermName xmlns="http://schemas.microsoft.com/office/infopath/2007/PartnerControls">Brand template</TermName>
+          <TermId xmlns="http://schemas.microsoft.com/office/infopath/2007/PartnerControls">a8dae13e-44bb-4ec1-860e-cc2305177641</TermId>
+        </TermInfo>
+      </Terms>
+    </ae4bb7bb5e1849a3a75b9d2ac781ba53>
+    <Creator xmlns="d95a5b16-1b8d-4c7c-9ebf-89c0983b6970" xsi:nil="true"/>
+    <Language xmlns="http://schemas.microsoft.com/sharepoint/v3">EN</Language>
+    <CSMeta2010Field xmlns="http://schemas.microsoft.com/sharepoint/v3">cf78e423-0039-41cd-b5ec-35c354449ae3;2019-08-12 17:17:32;PARTIALMANUALCLASSIFIED;Topic:2019-08-12 17:17:32|False||AUTOCLASSIFIED|2019-08-12 17:17:32|UNDEFINED|00000000-0000-0000-0000-000000000000;Organization:2018-06-14 16:30:37|False|2018-06-14 16:34:19|MANUALCLASSIFIED|2018-06-14 16:34:19|UNDEFINED|00000000-0000-0000-0000-000000000000;Industry:2019-08-12 17:17:32|False||AUTOCLASSIFIED|2019-08-12 17:17:32|UNDEFINED|00000000-0000-0000-0000-000000000000;Service line:2019-08-12 17:17:32|False||AUTOCLASSIFIED|2019-08-12 17:17:32|UNDEFINED|00000000-0000-0000-0000-000000000000;Business Practice:2019-08-12 17:17:32|False||AUTOCLASSIFIED|2019-08-12 17:17:32|UNDEFINED|00000000-0000-0000-0000-000000000000;Intellectual Property:2019-08-12 17:17:32|False||AUTOCLASSIFIED|2019-08-12 17:17:32|UNDEFINED|00000000-0000-0000-0000-000000000000;Content Format:2018-06-14 16:30:37|False|2018-06-14 16:34:19|MANUALCLASSIFIED|2018-06-14 16:34:19|UNDEFINED|00000000-0000-0000-0000-000000000000;Functions:2019-08-12 17:17:32|False||AUTOCLASSIFIED|2019-08-12 17:17:32|UNDEFINED|00000000-0000-0000-0000-000000000000;Geography:2019-08-12 17:17:32|False||AUTOCLASSIFIED|2019-08-12 17:17:32|UNDEFINED|00000000-0000-0000-0000-000000000000;False</CSMeta2010Field>
+    <Abstract xmlns="d95a5b16-1b8d-4c7c-9ebf-89c0983b6970">CGI widescreen graphic PowerPoint template - English version</Abstract>
+    <External_x0020_Use xmlns="d95a5b16-1b8d-4c7c-9ebf-89c0983b6970">No</External_x0020_Use>
+    <Owner_x0020_Organisation xmlns="d95a5b16-1b8d-4c7c-9ebf-89c0983b6970">Group</Owner_x0020_Organisation>
+    <BS_x0020_Document_x0020_Sub_x0020_Type xmlns="d95a5b16-1b8d-4c7c-9ebf-89c0983b6970">Business Aid</BS_x0020_Document_x0020_Sub_x0020_Type>
+    <Market xmlns="d95a5b16-1b8d-4c7c-9ebf-89c0983b6970"/>
+    <TaxKeywordTaxHTField xmlns="d95a5b16-1b8d-4c7c-9ebf-89c0983b6970">
+      <Terms xmlns="http://schemas.microsoft.com/office/infopath/2007/PartnerControls">
+        <TermInfo xmlns="http://schemas.microsoft.com/office/infopath/2007/PartnerControls">
+          <TermName xmlns="http://schemas.microsoft.com/office/infopath/2007/PartnerControls">PowerPoint</TermName>
+          <TermId xmlns="http://schemas.microsoft.com/office/infopath/2007/PartnerControls">5b4ca844-900d-4151-9c88-1a4b47550bee</TermId>
+        </TermInfo>
+      </Terms>
+    </TaxKeywordTaxHTField>
+    <Best_x0020_Before_x0020_Date xmlns="d95a5b16-1b8d-4c7c-9ebf-89c0983b6970">2023-06-13T23:00:00+00:00</Best_x0020_Before_x0020_Date>
+    <Published_x0020_By xmlns="d95a5b16-1b8d-4c7c-9ebf-89c0983b6970">
+      <UserInfo>
+        <DisplayName>Stiller, Regina C</DisplayName>
+        <AccountId>55167</AccountId>
+        <AccountType/>
+      </UserInfo>
+    </Published_x0020_By>
+    <Publication_x0020_Date xmlns="d95a5b16-1b8d-4c7c-9ebf-89c0983b6970">2018-06-13T23:00:00+00:00</Publication_x0020_Date>
+    <Geographic_x0020_Region xmlns="d95a5b16-1b8d-4c7c-9ebf-89c0983b6970"/>
+  </documentManagement>
+</p:properties>
 </file>
 
 <file path=customXml/itemProps1.xml><?xml version="1.0" encoding="utf-8"?>
@@ -29176,12 +29184,9 @@
 </file>
 
 <file path=customXml/itemProps2.xml><?xml version="1.0" encoding="utf-8"?>
-<ds:datastoreItem xmlns:ds="http://schemas.openxmlformats.org/officeDocument/2006/customXml" ds:itemID="{2F4C4F6A-F6A5-45C8-BAAA-52FB70E387C7}">
+<ds:datastoreItem xmlns:ds="http://schemas.openxmlformats.org/officeDocument/2006/customXml" ds:itemID="{B6223829-22B6-4242-8D82-2D6B02106581}">
   <ds:schemaRefs>
-    <ds:schemaRef ds:uri="http://schemas.microsoft.com/office/2006/metadata/properties"/>
-    <ds:schemaRef ds:uri="d95a5b16-1b8d-4c7c-9ebf-89c0983b6970"/>
-    <ds:schemaRef ds:uri="http://schemas.microsoft.com/office/infopath/2007/PartnerControls"/>
-    <ds:schemaRef ds:uri="http://schemas.microsoft.com/sharepoint/v3"/>
+    <ds:schemaRef ds:uri="http://schemas.microsoft.com/sharepoint/events"/>
   </ds:schemaRefs>
 </ds:datastoreItem>
 </file>
@@ -29206,9 +29211,12 @@
 </file>
 
 <file path=customXml/itemProps4.xml><?xml version="1.0" encoding="utf-8"?>
-<ds:datastoreItem xmlns:ds="http://schemas.openxmlformats.org/officeDocument/2006/customXml" ds:itemID="{B6223829-22B6-4242-8D82-2D6B02106581}">
+<ds:datastoreItem xmlns:ds="http://schemas.openxmlformats.org/officeDocument/2006/customXml" ds:itemID="{2F4C4F6A-F6A5-45C8-BAAA-52FB70E387C7}">
   <ds:schemaRefs>
-    <ds:schemaRef ds:uri="http://schemas.microsoft.com/sharepoint/events"/>
+    <ds:schemaRef ds:uri="http://schemas.microsoft.com/office/2006/metadata/properties"/>
+    <ds:schemaRef ds:uri="d95a5b16-1b8d-4c7c-9ebf-89c0983b6970"/>
+    <ds:schemaRef ds:uri="http://schemas.microsoft.com/office/infopath/2007/PartnerControls"/>
+    <ds:schemaRef ds:uri="http://schemas.microsoft.com/sharepoint/v3"/>
   </ds:schemaRefs>
 </ds:datastoreItem>
 </file>
</xml_diff>